<commit_message>
further work on slides
</commit_message>
<xml_diff>
--- a/Presentation/Final Presentation.pptx
+++ b/Presentation/Final Presentation.pptx
@@ -4,19 +4,24 @@
   <p:sldMasterIdLst>
     <p:sldMasterId id="2147483648" r:id="rId1"/>
   </p:sldMasterIdLst>
+  <p:notesMasterIdLst>
+    <p:notesMasterId r:id="rId16"/>
+  </p:notesMasterIdLst>
   <p:sldIdLst>
     <p:sldId id="256" r:id="rId2"/>
     <p:sldId id="257" r:id="rId3"/>
     <p:sldId id="258" r:id="rId4"/>
     <p:sldId id="259" r:id="rId5"/>
-    <p:sldId id="260" r:id="rId6"/>
-    <p:sldId id="261" r:id="rId7"/>
-    <p:sldId id="262" r:id="rId8"/>
-    <p:sldId id="263" r:id="rId9"/>
-    <p:sldId id="264" r:id="rId10"/>
-    <p:sldId id="265" r:id="rId11"/>
-    <p:sldId id="266" r:id="rId12"/>
-    <p:sldId id="267" r:id="rId13"/>
+    <p:sldId id="269" r:id="rId6"/>
+    <p:sldId id="260" r:id="rId7"/>
+    <p:sldId id="261" r:id="rId8"/>
+    <p:sldId id="268" r:id="rId9"/>
+    <p:sldId id="262" r:id="rId10"/>
+    <p:sldId id="263" r:id="rId11"/>
+    <p:sldId id="264" r:id="rId12"/>
+    <p:sldId id="265" r:id="rId13"/>
+    <p:sldId id="266" r:id="rId14"/>
+    <p:sldId id="267" r:id="rId15"/>
   </p:sldIdLst>
   <p:sldSz cx="12192000" cy="6858000"/>
   <p:notesSz cx="6858000" cy="9144000"/>
@@ -121,6 +126,439 @@
     </p:ext>
   </p:extLst>
 </p:presentation>
+</file>
+
+<file path=ppt/notesMasters/notesMaster1.xml><?xml version="1.0" encoding="utf-8"?>
+<p:notesMaster xmlns:a="http://schemas.openxmlformats.org/drawingml/2006/main" xmlns:r="http://schemas.openxmlformats.org/officeDocument/2006/relationships" xmlns:p="http://schemas.openxmlformats.org/presentationml/2006/main">
+  <p:cSld>
+    <p:bg>
+      <p:bgRef idx="1001">
+        <a:schemeClr val="bg1"/>
+      </p:bgRef>
+    </p:bg>
+    <p:spTree>
+      <p:nvGrpSpPr>
+        <p:cNvPr id="1" name=""/>
+        <p:cNvGrpSpPr/>
+        <p:nvPr/>
+      </p:nvGrpSpPr>
+      <p:grpSpPr>
+        <a:xfrm>
+          <a:off x="0" y="0"/>
+          <a:ext cx="0" cy="0"/>
+          <a:chOff x="0" y="0"/>
+          <a:chExt cx="0" cy="0"/>
+        </a:xfrm>
+      </p:grpSpPr>
+      <p:sp>
+        <p:nvSpPr>
+          <p:cNvPr id="2" name="Header Placeholder 1"/>
+          <p:cNvSpPr>
+            <a:spLocks noGrp="1"/>
+          </p:cNvSpPr>
+          <p:nvPr>
+            <p:ph type="hdr" sz="quarter"/>
+          </p:nvPr>
+        </p:nvSpPr>
+        <p:spPr>
+          <a:xfrm>
+            <a:off x="0" y="0"/>
+            <a:ext cx="2971800" cy="458788"/>
+          </a:xfrm>
+          <a:prstGeom prst="rect">
+            <a:avLst/>
+          </a:prstGeom>
+        </p:spPr>
+        <p:txBody>
+          <a:bodyPr vert="horz" lIns="91440" tIns="45720" rIns="91440" bIns="45720" rtlCol="0"/>
+          <a:lstStyle>
+            <a:lvl1pPr algn="l">
+              <a:defRPr sz="1200"/>
+            </a:lvl1pPr>
+          </a:lstStyle>
+          <a:p>
+            <a:endParaRPr lang="en-US"/>
+          </a:p>
+        </p:txBody>
+      </p:sp>
+      <p:sp>
+        <p:nvSpPr>
+          <p:cNvPr id="3" name="Date Placeholder 2"/>
+          <p:cNvSpPr>
+            <a:spLocks noGrp="1"/>
+          </p:cNvSpPr>
+          <p:nvPr>
+            <p:ph type="dt" idx="1"/>
+          </p:nvPr>
+        </p:nvSpPr>
+        <p:spPr>
+          <a:xfrm>
+            <a:off x="3884613" y="0"/>
+            <a:ext cx="2971800" cy="458788"/>
+          </a:xfrm>
+          <a:prstGeom prst="rect">
+            <a:avLst/>
+          </a:prstGeom>
+        </p:spPr>
+        <p:txBody>
+          <a:bodyPr vert="horz" lIns="91440" tIns="45720" rIns="91440" bIns="45720" rtlCol="0"/>
+          <a:lstStyle>
+            <a:lvl1pPr algn="r">
+              <a:defRPr sz="1200"/>
+            </a:lvl1pPr>
+          </a:lstStyle>
+          <a:p>
+            <a:fld id="{1C762E85-DB47-45FA-B927-186CB0BA773D}" type="datetimeFigureOut">
+              <a:rPr lang="en-US" smtClean="0"/>
+              <a:t>3/7/2020</a:t>
+            </a:fld>
+            <a:endParaRPr lang="en-US"/>
+          </a:p>
+        </p:txBody>
+      </p:sp>
+      <p:sp>
+        <p:nvSpPr>
+          <p:cNvPr id="4" name="Slide Image Placeholder 3"/>
+          <p:cNvSpPr>
+            <a:spLocks noGrp="1" noRot="1" noChangeAspect="1"/>
+          </p:cNvSpPr>
+          <p:nvPr>
+            <p:ph type="sldImg" idx="2"/>
+          </p:nvPr>
+        </p:nvSpPr>
+        <p:spPr>
+          <a:xfrm>
+            <a:off x="685800" y="1143000"/>
+            <a:ext cx="5486400" cy="3086100"/>
+          </a:xfrm>
+          <a:prstGeom prst="rect">
+            <a:avLst/>
+          </a:prstGeom>
+          <a:noFill/>
+          <a:ln w="12700">
+            <a:solidFill>
+              <a:prstClr val="black"/>
+            </a:solidFill>
+          </a:ln>
+        </p:spPr>
+        <p:txBody>
+          <a:bodyPr vert="horz" lIns="91440" tIns="45720" rIns="91440" bIns="45720" rtlCol="0" anchor="ctr"/>
+          <a:lstStyle/>
+          <a:p>
+            <a:endParaRPr lang="en-US"/>
+          </a:p>
+        </p:txBody>
+      </p:sp>
+      <p:sp>
+        <p:nvSpPr>
+          <p:cNvPr id="5" name="Notes Placeholder 4"/>
+          <p:cNvSpPr>
+            <a:spLocks noGrp="1"/>
+          </p:cNvSpPr>
+          <p:nvPr>
+            <p:ph type="body" sz="quarter" idx="3"/>
+          </p:nvPr>
+        </p:nvSpPr>
+        <p:spPr>
+          <a:xfrm>
+            <a:off x="685800" y="4400550"/>
+            <a:ext cx="5486400" cy="3600450"/>
+          </a:xfrm>
+          <a:prstGeom prst="rect">
+            <a:avLst/>
+          </a:prstGeom>
+        </p:spPr>
+        <p:txBody>
+          <a:bodyPr vert="horz" lIns="91440" tIns="45720" rIns="91440" bIns="45720" rtlCol="0"/>
+          <a:lstStyle/>
+          <a:p>
+            <a:pPr lvl="0"/>
+            <a:r>
+              <a:rPr lang="en-US"/>
+              <a:t>Click to edit Master text styles</a:t>
+            </a:r>
+          </a:p>
+          <a:p>
+            <a:pPr lvl="1"/>
+            <a:r>
+              <a:rPr lang="en-US"/>
+              <a:t>Second level</a:t>
+            </a:r>
+          </a:p>
+          <a:p>
+            <a:pPr lvl="2"/>
+            <a:r>
+              <a:rPr lang="en-US"/>
+              <a:t>Third level</a:t>
+            </a:r>
+          </a:p>
+          <a:p>
+            <a:pPr lvl="3"/>
+            <a:r>
+              <a:rPr lang="en-US"/>
+              <a:t>Fourth level</a:t>
+            </a:r>
+          </a:p>
+          <a:p>
+            <a:pPr lvl="4"/>
+            <a:r>
+              <a:rPr lang="en-US"/>
+              <a:t>Fifth level</a:t>
+            </a:r>
+          </a:p>
+        </p:txBody>
+      </p:sp>
+      <p:sp>
+        <p:nvSpPr>
+          <p:cNvPr id="6" name="Footer Placeholder 5"/>
+          <p:cNvSpPr>
+            <a:spLocks noGrp="1"/>
+          </p:cNvSpPr>
+          <p:nvPr>
+            <p:ph type="ftr" sz="quarter" idx="4"/>
+          </p:nvPr>
+        </p:nvSpPr>
+        <p:spPr>
+          <a:xfrm>
+            <a:off x="0" y="8685213"/>
+            <a:ext cx="2971800" cy="458787"/>
+          </a:xfrm>
+          <a:prstGeom prst="rect">
+            <a:avLst/>
+          </a:prstGeom>
+        </p:spPr>
+        <p:txBody>
+          <a:bodyPr vert="horz" lIns="91440" tIns="45720" rIns="91440" bIns="45720" rtlCol="0" anchor="b"/>
+          <a:lstStyle>
+            <a:lvl1pPr algn="l">
+              <a:defRPr sz="1200"/>
+            </a:lvl1pPr>
+          </a:lstStyle>
+          <a:p>
+            <a:endParaRPr lang="en-US"/>
+          </a:p>
+        </p:txBody>
+      </p:sp>
+      <p:sp>
+        <p:nvSpPr>
+          <p:cNvPr id="7" name="Slide Number Placeholder 6"/>
+          <p:cNvSpPr>
+            <a:spLocks noGrp="1"/>
+          </p:cNvSpPr>
+          <p:nvPr>
+            <p:ph type="sldNum" sz="quarter" idx="5"/>
+          </p:nvPr>
+        </p:nvSpPr>
+        <p:spPr>
+          <a:xfrm>
+            <a:off x="3884613" y="8685213"/>
+            <a:ext cx="2971800" cy="458787"/>
+          </a:xfrm>
+          <a:prstGeom prst="rect">
+            <a:avLst/>
+          </a:prstGeom>
+        </p:spPr>
+        <p:txBody>
+          <a:bodyPr vert="horz" lIns="91440" tIns="45720" rIns="91440" bIns="45720" rtlCol="0" anchor="b"/>
+          <a:lstStyle>
+            <a:lvl1pPr algn="r">
+              <a:defRPr sz="1200"/>
+            </a:lvl1pPr>
+          </a:lstStyle>
+          <a:p>
+            <a:fld id="{86B51F0D-3D11-4D75-BDA0-EB9340C57519}" type="slidenum">
+              <a:rPr lang="en-US" smtClean="0"/>
+              <a:t>‹#›</a:t>
+            </a:fld>
+            <a:endParaRPr lang="en-US"/>
+          </a:p>
+        </p:txBody>
+      </p:sp>
+    </p:spTree>
+    <p:extLst>
+      <p:ext uri="{BB962C8B-B14F-4D97-AF65-F5344CB8AC3E}">
+        <p14:creationId xmlns:p14="http://schemas.microsoft.com/office/powerpoint/2010/main" val="4288551012"/>
+      </p:ext>
+    </p:extLst>
+  </p:cSld>
+  <p:clrMap bg1="lt1" tx1="dk1" bg2="lt2" tx2="dk2" accent1="accent1" accent2="accent2" accent3="accent3" accent4="accent4" accent5="accent5" accent6="accent6" hlink="hlink" folHlink="folHlink"/>
+  <p:notesStyle>
+    <a:lvl1pPr marL="0" algn="l" defTabSz="914400" rtl="0" eaLnBrk="1" latinLnBrk="0" hangingPunct="1">
+      <a:defRPr sz="1200" kern="1200">
+        <a:solidFill>
+          <a:schemeClr val="tx1"/>
+        </a:solidFill>
+        <a:latin typeface="+mn-lt"/>
+        <a:ea typeface="+mn-ea"/>
+        <a:cs typeface="+mn-cs"/>
+      </a:defRPr>
+    </a:lvl1pPr>
+    <a:lvl2pPr marL="457200" algn="l" defTabSz="914400" rtl="0" eaLnBrk="1" latinLnBrk="0" hangingPunct="1">
+      <a:defRPr sz="1200" kern="1200">
+        <a:solidFill>
+          <a:schemeClr val="tx1"/>
+        </a:solidFill>
+        <a:latin typeface="+mn-lt"/>
+        <a:ea typeface="+mn-ea"/>
+        <a:cs typeface="+mn-cs"/>
+      </a:defRPr>
+    </a:lvl2pPr>
+    <a:lvl3pPr marL="914400" algn="l" defTabSz="914400" rtl="0" eaLnBrk="1" latinLnBrk="0" hangingPunct="1">
+      <a:defRPr sz="1200" kern="1200">
+        <a:solidFill>
+          <a:schemeClr val="tx1"/>
+        </a:solidFill>
+        <a:latin typeface="+mn-lt"/>
+        <a:ea typeface="+mn-ea"/>
+        <a:cs typeface="+mn-cs"/>
+      </a:defRPr>
+    </a:lvl3pPr>
+    <a:lvl4pPr marL="1371600" algn="l" defTabSz="914400" rtl="0" eaLnBrk="1" latinLnBrk="0" hangingPunct="1">
+      <a:defRPr sz="1200" kern="1200">
+        <a:solidFill>
+          <a:schemeClr val="tx1"/>
+        </a:solidFill>
+        <a:latin typeface="+mn-lt"/>
+        <a:ea typeface="+mn-ea"/>
+        <a:cs typeface="+mn-cs"/>
+      </a:defRPr>
+    </a:lvl4pPr>
+    <a:lvl5pPr marL="1828800" algn="l" defTabSz="914400" rtl="0" eaLnBrk="1" latinLnBrk="0" hangingPunct="1">
+      <a:defRPr sz="1200" kern="1200">
+        <a:solidFill>
+          <a:schemeClr val="tx1"/>
+        </a:solidFill>
+        <a:latin typeface="+mn-lt"/>
+        <a:ea typeface="+mn-ea"/>
+        <a:cs typeface="+mn-cs"/>
+      </a:defRPr>
+    </a:lvl5pPr>
+    <a:lvl6pPr marL="2286000" algn="l" defTabSz="914400" rtl="0" eaLnBrk="1" latinLnBrk="0" hangingPunct="1">
+      <a:defRPr sz="1200" kern="1200">
+        <a:solidFill>
+          <a:schemeClr val="tx1"/>
+        </a:solidFill>
+        <a:latin typeface="+mn-lt"/>
+        <a:ea typeface="+mn-ea"/>
+        <a:cs typeface="+mn-cs"/>
+      </a:defRPr>
+    </a:lvl6pPr>
+    <a:lvl7pPr marL="2743200" algn="l" defTabSz="914400" rtl="0" eaLnBrk="1" latinLnBrk="0" hangingPunct="1">
+      <a:defRPr sz="1200" kern="1200">
+        <a:solidFill>
+          <a:schemeClr val="tx1"/>
+        </a:solidFill>
+        <a:latin typeface="+mn-lt"/>
+        <a:ea typeface="+mn-ea"/>
+        <a:cs typeface="+mn-cs"/>
+      </a:defRPr>
+    </a:lvl7pPr>
+    <a:lvl8pPr marL="3200400" algn="l" defTabSz="914400" rtl="0" eaLnBrk="1" latinLnBrk="0" hangingPunct="1">
+      <a:defRPr sz="1200" kern="1200">
+        <a:solidFill>
+          <a:schemeClr val="tx1"/>
+        </a:solidFill>
+        <a:latin typeface="+mn-lt"/>
+        <a:ea typeface="+mn-ea"/>
+        <a:cs typeface="+mn-cs"/>
+      </a:defRPr>
+    </a:lvl8pPr>
+    <a:lvl9pPr marL="3657600" algn="l" defTabSz="914400" rtl="0" eaLnBrk="1" latinLnBrk="0" hangingPunct="1">
+      <a:defRPr sz="1200" kern="1200">
+        <a:solidFill>
+          <a:schemeClr val="tx1"/>
+        </a:solidFill>
+        <a:latin typeface="+mn-lt"/>
+        <a:ea typeface="+mn-ea"/>
+        <a:cs typeface="+mn-cs"/>
+      </a:defRPr>
+    </a:lvl9pPr>
+  </p:notesStyle>
+</p:notesMaster>
+</file>
+
+<file path=ppt/notesSlides/notesSlide1.xml><?xml version="1.0" encoding="utf-8"?>
+<p:notes xmlns:a="http://schemas.openxmlformats.org/drawingml/2006/main" xmlns:r="http://schemas.openxmlformats.org/officeDocument/2006/relationships" xmlns:p="http://schemas.openxmlformats.org/presentationml/2006/main">
+  <p:cSld>
+    <p:spTree>
+      <p:nvGrpSpPr>
+        <p:cNvPr id="1" name=""/>
+        <p:cNvGrpSpPr/>
+        <p:nvPr/>
+      </p:nvGrpSpPr>
+      <p:grpSpPr>
+        <a:xfrm>
+          <a:off x="0" y="0"/>
+          <a:ext cx="0" cy="0"/>
+          <a:chOff x="0" y="0"/>
+          <a:chExt cx="0" cy="0"/>
+        </a:xfrm>
+      </p:grpSpPr>
+      <p:sp>
+        <p:nvSpPr>
+          <p:cNvPr id="2" name="Slide Image Placeholder 1"/>
+          <p:cNvSpPr>
+            <a:spLocks noGrp="1" noRot="1" noChangeAspect="1"/>
+          </p:cNvSpPr>
+          <p:nvPr>
+            <p:ph type="sldImg"/>
+          </p:nvPr>
+        </p:nvSpPr>
+        <p:spPr/>
+      </p:sp>
+      <p:sp>
+        <p:nvSpPr>
+          <p:cNvPr id="3" name="Notes Placeholder 2"/>
+          <p:cNvSpPr>
+            <a:spLocks noGrp="1"/>
+          </p:cNvSpPr>
+          <p:nvPr>
+            <p:ph type="body" idx="1"/>
+          </p:nvPr>
+        </p:nvSpPr>
+        <p:spPr/>
+        <p:txBody>
+          <a:bodyPr/>
+          <a:lstStyle/>
+          <a:p>
+            <a:endParaRPr lang="en-US" dirty="0"/>
+          </a:p>
+        </p:txBody>
+      </p:sp>
+      <p:sp>
+        <p:nvSpPr>
+          <p:cNvPr id="4" name="Slide Number Placeholder 3"/>
+          <p:cNvSpPr>
+            <a:spLocks noGrp="1"/>
+          </p:cNvSpPr>
+          <p:nvPr>
+            <p:ph type="sldNum" sz="quarter" idx="5"/>
+          </p:nvPr>
+        </p:nvSpPr>
+        <p:spPr/>
+        <p:txBody>
+          <a:bodyPr/>
+          <a:lstStyle/>
+          <a:p>
+            <a:fld id="{86B51F0D-3D11-4D75-BDA0-EB9340C57519}" type="slidenum">
+              <a:rPr lang="en-US" smtClean="0"/>
+              <a:t>3</a:t>
+            </a:fld>
+            <a:endParaRPr lang="en-US"/>
+          </a:p>
+        </p:txBody>
+      </p:sp>
+    </p:spTree>
+    <p:extLst>
+      <p:ext uri="{BB962C8B-B14F-4D97-AF65-F5344CB8AC3E}">
+        <p14:creationId xmlns:p14="http://schemas.microsoft.com/office/powerpoint/2010/main" val="2840126479"/>
+      </p:ext>
+    </p:extLst>
+  </p:cSld>
+  <p:clrMapOvr>
+    <a:masterClrMapping/>
+  </p:clrMapOvr>
+</p:notes>
 </file>
 
 <file path=ppt/slideLayouts/slideLayout1.xml><?xml version="1.0" encoding="utf-8"?>
@@ -3365,21 +3803,8 @@
           <a:p>
             <a:r>
               <a:rPr lang="en-US" dirty="0"/>
-              <a:t>Dataception </a:t>
-            </a:r>
-            <a:r>
-              <a:rPr lang="en-US" dirty="0" err="1"/>
-              <a:t>hee</a:t>
-            </a:r>
-            <a:r>
-              <a:rPr lang="en-US" dirty="0"/>
-              <a:t> </a:t>
-            </a:r>
-            <a:r>
-              <a:rPr lang="en-US" dirty="0" err="1"/>
-              <a:t>hee</a:t>
-            </a:r>
-            <a:endParaRPr lang="en-US" dirty="0"/>
+              <a:t>Dataception 😎</a:t>
+            </a:r>
           </a:p>
         </p:txBody>
       </p:sp>
@@ -3406,13 +3831,18 @@
           </a:xfrm>
         </p:spPr>
         <p:txBody>
-          <a:bodyPr/>
+          <a:bodyPr>
+            <a:normAutofit/>
+          </a:bodyPr>
           <a:lstStyle/>
           <a:p>
             <a:r>
               <a:rPr lang="en-US" dirty="0"/>
-              <a:t>Investigating Varying Benefits &amp; Qualities Across Data Science Jobs</a:t>
-            </a:r>
+              <a:t>Investigating the Varying Qualities of Data Science Jobs</a:t>
+            </a:r>
+          </a:p>
+          <a:p>
+            <a:endParaRPr lang="en-US" dirty="0"/>
           </a:p>
         </p:txBody>
       </p:sp>
@@ -3470,6 +3900,230 @@
               <a:rPr lang="en-US" dirty="0"/>
               <a:t>Anmol Srivastava</a:t>
             </a:r>
+          </a:p>
+        </p:txBody>
+      </p:sp>
+      <p:sp>
+        <p:nvSpPr>
+          <p:cNvPr id="5" name="Subtitle 2">
+            <a:extLst>
+              <a:ext uri="{FF2B5EF4-FFF2-40B4-BE49-F238E27FC236}">
+                <a16:creationId xmlns:a16="http://schemas.microsoft.com/office/drawing/2014/main" id="{91CEA407-FD48-4A58-BCE4-D9D7C847300E}"/>
+              </a:ext>
+            </a:extLst>
+          </p:cNvPr>
+          <p:cNvSpPr txBox="1">
+            <a:spLocks/>
+          </p:cNvSpPr>
+          <p:nvPr/>
+        </p:nvSpPr>
+        <p:spPr>
+          <a:xfrm>
+            <a:off x="-943511" y="348962"/>
+            <a:ext cx="9144000" cy="2106562"/>
+          </a:xfrm>
+          <a:prstGeom prst="rect">
+            <a:avLst/>
+          </a:prstGeom>
+        </p:spPr>
+        <p:txBody>
+          <a:bodyPr vert="horz" lIns="91440" tIns="45720" rIns="91440" bIns="45720" rtlCol="0">
+            <a:normAutofit/>
+          </a:bodyPr>
+          <a:lstStyle>
+            <a:lvl1pPr marL="0" indent="0" algn="ctr" defTabSz="914400" rtl="0" eaLnBrk="1" latinLnBrk="0" hangingPunct="1">
+              <a:lnSpc>
+                <a:spcPct val="90000"/>
+              </a:lnSpc>
+              <a:spcBef>
+                <a:spcPts val="1000"/>
+              </a:spcBef>
+              <a:buFont typeface="Arial" panose="020B0604020202020204" pitchFamily="34" charset="0"/>
+              <a:buNone/>
+              <a:defRPr sz="2400" kern="1200">
+                <a:solidFill>
+                  <a:schemeClr val="tx1"/>
+                </a:solidFill>
+                <a:latin typeface="+mn-lt"/>
+                <a:ea typeface="+mn-ea"/>
+                <a:cs typeface="+mn-cs"/>
+              </a:defRPr>
+            </a:lvl1pPr>
+            <a:lvl2pPr marL="457200" indent="0" algn="ctr" defTabSz="914400" rtl="0" eaLnBrk="1" latinLnBrk="0" hangingPunct="1">
+              <a:lnSpc>
+                <a:spcPct val="90000"/>
+              </a:lnSpc>
+              <a:spcBef>
+                <a:spcPts val="500"/>
+              </a:spcBef>
+              <a:buFont typeface="Arial" panose="020B0604020202020204" pitchFamily="34" charset="0"/>
+              <a:buNone/>
+              <a:defRPr sz="2000" kern="1200">
+                <a:solidFill>
+                  <a:schemeClr val="tx1"/>
+                </a:solidFill>
+                <a:latin typeface="+mn-lt"/>
+                <a:ea typeface="+mn-ea"/>
+                <a:cs typeface="+mn-cs"/>
+              </a:defRPr>
+            </a:lvl2pPr>
+            <a:lvl3pPr marL="914400" indent="0" algn="ctr" defTabSz="914400" rtl="0" eaLnBrk="1" latinLnBrk="0" hangingPunct="1">
+              <a:lnSpc>
+                <a:spcPct val="90000"/>
+              </a:lnSpc>
+              <a:spcBef>
+                <a:spcPts val="500"/>
+              </a:spcBef>
+              <a:buFont typeface="Arial" panose="020B0604020202020204" pitchFamily="34" charset="0"/>
+              <a:buNone/>
+              <a:defRPr sz="1800" kern="1200">
+                <a:solidFill>
+                  <a:schemeClr val="tx1"/>
+                </a:solidFill>
+                <a:latin typeface="+mn-lt"/>
+                <a:ea typeface="+mn-ea"/>
+                <a:cs typeface="+mn-cs"/>
+              </a:defRPr>
+            </a:lvl3pPr>
+            <a:lvl4pPr marL="1371600" indent="0" algn="ctr" defTabSz="914400" rtl="0" eaLnBrk="1" latinLnBrk="0" hangingPunct="1">
+              <a:lnSpc>
+                <a:spcPct val="90000"/>
+              </a:lnSpc>
+              <a:spcBef>
+                <a:spcPts val="500"/>
+              </a:spcBef>
+              <a:buFont typeface="Arial" panose="020B0604020202020204" pitchFamily="34" charset="0"/>
+              <a:buNone/>
+              <a:defRPr sz="1600" kern="1200">
+                <a:solidFill>
+                  <a:schemeClr val="tx1"/>
+                </a:solidFill>
+                <a:latin typeface="+mn-lt"/>
+                <a:ea typeface="+mn-ea"/>
+                <a:cs typeface="+mn-cs"/>
+              </a:defRPr>
+            </a:lvl4pPr>
+            <a:lvl5pPr marL="1828800" indent="0" algn="ctr" defTabSz="914400" rtl="0" eaLnBrk="1" latinLnBrk="0" hangingPunct="1">
+              <a:lnSpc>
+                <a:spcPct val="90000"/>
+              </a:lnSpc>
+              <a:spcBef>
+                <a:spcPts val="500"/>
+              </a:spcBef>
+              <a:buFont typeface="Arial" panose="020B0604020202020204" pitchFamily="34" charset="0"/>
+              <a:buNone/>
+              <a:defRPr sz="1600" kern="1200">
+                <a:solidFill>
+                  <a:schemeClr val="tx1"/>
+                </a:solidFill>
+                <a:latin typeface="+mn-lt"/>
+                <a:ea typeface="+mn-ea"/>
+                <a:cs typeface="+mn-cs"/>
+              </a:defRPr>
+            </a:lvl5pPr>
+            <a:lvl6pPr marL="2286000" indent="0" algn="ctr" defTabSz="914400" rtl="0" eaLnBrk="1" latinLnBrk="0" hangingPunct="1">
+              <a:lnSpc>
+                <a:spcPct val="90000"/>
+              </a:lnSpc>
+              <a:spcBef>
+                <a:spcPts val="500"/>
+              </a:spcBef>
+              <a:buFont typeface="Arial" panose="020B0604020202020204" pitchFamily="34" charset="0"/>
+              <a:buNone/>
+              <a:defRPr sz="1600" kern="1200">
+                <a:solidFill>
+                  <a:schemeClr val="tx1"/>
+                </a:solidFill>
+                <a:latin typeface="+mn-lt"/>
+                <a:ea typeface="+mn-ea"/>
+                <a:cs typeface="+mn-cs"/>
+              </a:defRPr>
+            </a:lvl6pPr>
+            <a:lvl7pPr marL="2743200" indent="0" algn="ctr" defTabSz="914400" rtl="0" eaLnBrk="1" latinLnBrk="0" hangingPunct="1">
+              <a:lnSpc>
+                <a:spcPct val="90000"/>
+              </a:lnSpc>
+              <a:spcBef>
+                <a:spcPts val="500"/>
+              </a:spcBef>
+              <a:buFont typeface="Arial" panose="020B0604020202020204" pitchFamily="34" charset="0"/>
+              <a:buNone/>
+              <a:defRPr sz="1600" kern="1200">
+                <a:solidFill>
+                  <a:schemeClr val="tx1"/>
+                </a:solidFill>
+                <a:latin typeface="+mn-lt"/>
+                <a:ea typeface="+mn-ea"/>
+                <a:cs typeface="+mn-cs"/>
+              </a:defRPr>
+            </a:lvl7pPr>
+            <a:lvl8pPr marL="3200400" indent="0" algn="ctr" defTabSz="914400" rtl="0" eaLnBrk="1" latinLnBrk="0" hangingPunct="1">
+              <a:lnSpc>
+                <a:spcPct val="90000"/>
+              </a:lnSpc>
+              <a:spcBef>
+                <a:spcPts val="500"/>
+              </a:spcBef>
+              <a:buFont typeface="Arial" panose="020B0604020202020204" pitchFamily="34" charset="0"/>
+              <a:buNone/>
+              <a:defRPr sz="1600" kern="1200">
+                <a:solidFill>
+                  <a:schemeClr val="tx1"/>
+                </a:solidFill>
+                <a:latin typeface="+mn-lt"/>
+                <a:ea typeface="+mn-ea"/>
+                <a:cs typeface="+mn-cs"/>
+              </a:defRPr>
+            </a:lvl8pPr>
+            <a:lvl9pPr marL="3657600" indent="0" algn="ctr" defTabSz="914400" rtl="0" eaLnBrk="1" latinLnBrk="0" hangingPunct="1">
+              <a:lnSpc>
+                <a:spcPct val="90000"/>
+              </a:lnSpc>
+              <a:spcBef>
+                <a:spcPts val="500"/>
+              </a:spcBef>
+              <a:buFont typeface="Arial" panose="020B0604020202020204" pitchFamily="34" charset="0"/>
+              <a:buNone/>
+              <a:defRPr sz="1600" kern="1200">
+                <a:solidFill>
+                  <a:schemeClr val="tx1"/>
+                </a:solidFill>
+                <a:latin typeface="+mn-lt"/>
+                <a:ea typeface="+mn-ea"/>
+                <a:cs typeface="+mn-cs"/>
+              </a:defRPr>
+            </a:lvl9pPr>
+          </a:lstStyle>
+          <a:p>
+            <a:r>
+              <a:rPr lang="en-US" dirty="0">
+                <a:solidFill>
+                  <a:srgbClr val="FF0000"/>
+                </a:solidFill>
+              </a:rPr>
+              <a:t>RED HEADER </a:t>
+            </a:r>
+            <a:r>
+              <a:rPr lang="en-US" dirty="0"/>
+              <a:t>– ADDITIONS NEEDED</a:t>
+            </a:r>
+          </a:p>
+          <a:p>
+            <a:r>
+              <a:rPr lang="en-US" dirty="0">
+                <a:solidFill>
+                  <a:schemeClr val="accent1"/>
+                </a:solidFill>
+              </a:rPr>
+              <a:t>BLUE HEADER </a:t>
+            </a:r>
+            <a:r>
+              <a:rPr lang="en-US" dirty="0"/>
+              <a:t>– DONE BUT REVIEW NEEDED</a:t>
+            </a:r>
+          </a:p>
+          <a:p>
+            <a:endParaRPr lang="en-US" dirty="0"/>
           </a:p>
         </p:txBody>
       </p:sp>
@@ -3508,7 +4162,7 @@
           <p:cNvPr id="2" name="Title 1">
             <a:extLst>
               <a:ext uri="{FF2B5EF4-FFF2-40B4-BE49-F238E27FC236}">
-                <a16:creationId xmlns:a16="http://schemas.microsoft.com/office/drawing/2014/main" id="{D18D8B46-542F-4295-9C80-3C1BCFC5FE5D}"/>
+                <a16:creationId xmlns:a16="http://schemas.microsoft.com/office/drawing/2014/main" id="{012C7200-64BB-455A-BBB3-A8E823144736}"/>
               </a:ext>
             </a:extLst>
           </p:cNvPr>
@@ -3525,42 +4179,40 @@
           <a:lstStyle/>
           <a:p>
             <a:r>
+              <a:rPr lang="en-US" dirty="0">
+                <a:solidFill>
+                  <a:srgbClr val="FF0000"/>
+                </a:solidFill>
+              </a:rPr>
+              <a:t>Visualizing Findings for [Q2]</a:t>
+            </a:r>
+          </a:p>
+        </p:txBody>
+      </p:sp>
+      <p:sp>
+        <p:nvSpPr>
+          <p:cNvPr id="3" name="Content Placeholder 2">
+            <a:extLst>
+              <a:ext uri="{FF2B5EF4-FFF2-40B4-BE49-F238E27FC236}">
+                <a16:creationId xmlns:a16="http://schemas.microsoft.com/office/drawing/2014/main" id="{E492AE00-E6E0-4018-A611-A142E7DBBAB7}"/>
+              </a:ext>
+            </a:extLst>
+          </p:cNvPr>
+          <p:cNvSpPr>
+            <a:spLocks noGrp="1"/>
+          </p:cNvSpPr>
+          <p:nvPr>
+            <p:ph idx="1"/>
+          </p:nvPr>
+        </p:nvSpPr>
+        <p:spPr/>
+        <p:txBody>
+          <a:bodyPr/>
+          <a:lstStyle/>
+          <a:p>
+            <a:r>
               <a:rPr lang="en-US" dirty="0"/>
-              <a:t>Results Can Be Formalized and Interpreted </a:t>
-            </a:r>
-          </a:p>
-        </p:txBody>
-      </p:sp>
-      <p:sp>
-        <p:nvSpPr>
-          <p:cNvPr id="3" name="Content Placeholder 2">
-            <a:extLst>
-              <a:ext uri="{FF2B5EF4-FFF2-40B4-BE49-F238E27FC236}">
-                <a16:creationId xmlns:a16="http://schemas.microsoft.com/office/drawing/2014/main" id="{DB26161D-86B2-4722-97BE-CD6C3D640F94}"/>
-              </a:ext>
-            </a:extLst>
-          </p:cNvPr>
-          <p:cNvSpPr>
-            <a:spLocks noGrp="1"/>
-          </p:cNvSpPr>
-          <p:nvPr>
-            <p:ph idx="1"/>
-          </p:nvPr>
-        </p:nvSpPr>
-        <p:spPr/>
-        <p:txBody>
-          <a:bodyPr/>
-          <a:lstStyle/>
-          <a:p>
-            <a:r>
-              <a:rPr lang="en-US" dirty="0"/>
-              <a:t>Basically the discussion section, what test results mean </a:t>
-            </a:r>
-          </a:p>
-          <a:p>
-            <a:r>
-              <a:rPr lang="en-US" dirty="0"/>
-              <a:t>Poo </a:t>
+              <a:t>Hello</a:t>
             </a:r>
           </a:p>
         </p:txBody>
@@ -3568,7 +4220,7 @@
     </p:spTree>
     <p:extLst>
       <p:ext uri="{BB962C8B-B14F-4D97-AF65-F5344CB8AC3E}">
-        <p14:creationId xmlns:p14="http://schemas.microsoft.com/office/powerpoint/2010/main" val="1311785409"/>
+        <p14:creationId xmlns:p14="http://schemas.microsoft.com/office/powerpoint/2010/main" val="3155543544"/>
       </p:ext>
     </p:extLst>
   </p:cSld>
@@ -3600,7 +4252,7 @@
           <p:cNvPr id="2" name="Title 1">
             <a:extLst>
               <a:ext uri="{FF2B5EF4-FFF2-40B4-BE49-F238E27FC236}">
-                <a16:creationId xmlns:a16="http://schemas.microsoft.com/office/drawing/2014/main" id="{445C4B18-2814-4770-B492-A9E33C89866B}"/>
+                <a16:creationId xmlns:a16="http://schemas.microsoft.com/office/drawing/2014/main" id="{012C7200-64BB-455A-BBB3-A8E823144736}"/>
               </a:ext>
             </a:extLst>
           </p:cNvPr>
@@ -3617,60 +4269,40 @@
           <a:lstStyle/>
           <a:p>
             <a:r>
+              <a:rPr lang="en-US" dirty="0">
+                <a:solidFill>
+                  <a:srgbClr val="FF0000"/>
+                </a:solidFill>
+              </a:rPr>
+              <a:t>Visualizing Findings for [Q3]</a:t>
+            </a:r>
+          </a:p>
+        </p:txBody>
+      </p:sp>
+      <p:sp>
+        <p:nvSpPr>
+          <p:cNvPr id="3" name="Content Placeholder 2">
+            <a:extLst>
+              <a:ext uri="{FF2B5EF4-FFF2-40B4-BE49-F238E27FC236}">
+                <a16:creationId xmlns:a16="http://schemas.microsoft.com/office/drawing/2014/main" id="{E492AE00-E6E0-4018-A611-A142E7DBBAB7}"/>
+              </a:ext>
+            </a:extLst>
+          </p:cNvPr>
+          <p:cNvSpPr>
+            <a:spLocks noGrp="1"/>
+          </p:cNvSpPr>
+          <p:nvPr>
+            <p:ph idx="1"/>
+          </p:nvPr>
+        </p:nvSpPr>
+        <p:spPr/>
+        <p:txBody>
+          <a:bodyPr/>
+          <a:lstStyle/>
+          <a:p>
+            <a:r>
               <a:rPr lang="en-US" dirty="0"/>
-              <a:t>Several Limitations Affect These Analyses</a:t>
-            </a:r>
-          </a:p>
-        </p:txBody>
-      </p:sp>
-      <p:sp>
-        <p:nvSpPr>
-          <p:cNvPr id="3" name="Content Placeholder 2">
-            <a:extLst>
-              <a:ext uri="{FF2B5EF4-FFF2-40B4-BE49-F238E27FC236}">
-                <a16:creationId xmlns:a16="http://schemas.microsoft.com/office/drawing/2014/main" id="{2C8A6C9B-ADAD-4C7E-A303-05FB967162A5}"/>
-              </a:ext>
-            </a:extLst>
-          </p:cNvPr>
-          <p:cNvSpPr>
-            <a:spLocks noGrp="1"/>
-          </p:cNvSpPr>
-          <p:nvPr>
-            <p:ph idx="1"/>
-          </p:nvPr>
-        </p:nvSpPr>
-        <p:spPr/>
-        <p:txBody>
-          <a:bodyPr/>
-          <a:lstStyle/>
-          <a:p>
-            <a:r>
-              <a:rPr lang="en-US" dirty="0"/>
-              <a:t>Some for q1</a:t>
-            </a:r>
-          </a:p>
-          <a:p>
-            <a:r>
-              <a:rPr lang="en-US" dirty="0"/>
-              <a:t>Some for q2</a:t>
-            </a:r>
-          </a:p>
-          <a:p>
-            <a:r>
-              <a:rPr lang="en-US" dirty="0"/>
-              <a:t>Some for q3</a:t>
-            </a:r>
-          </a:p>
-          <a:p>
-            <a:r>
-              <a:rPr lang="en-US" dirty="0"/>
-              <a:t>Any in general related to data/assumptions</a:t>
-            </a:r>
-          </a:p>
-          <a:p>
-            <a:r>
-              <a:rPr lang="en-US" dirty="0"/>
-              <a:t>Any related to stat modeling we did </a:t>
+              <a:t>Hello</a:t>
             </a:r>
           </a:p>
         </p:txBody>
@@ -3678,7 +4310,7 @@
     </p:spTree>
     <p:extLst>
       <p:ext uri="{BB962C8B-B14F-4D97-AF65-F5344CB8AC3E}">
-        <p14:creationId xmlns:p14="http://schemas.microsoft.com/office/powerpoint/2010/main" val="3840243585"/>
+        <p14:creationId xmlns:p14="http://schemas.microsoft.com/office/powerpoint/2010/main" val="1970257953"/>
       </p:ext>
     </p:extLst>
   </p:cSld>
@@ -3710,6 +4342,216 @@
           <p:cNvPr id="2" name="Title 1">
             <a:extLst>
               <a:ext uri="{FF2B5EF4-FFF2-40B4-BE49-F238E27FC236}">
+                <a16:creationId xmlns:a16="http://schemas.microsoft.com/office/drawing/2014/main" id="{D18D8B46-542F-4295-9C80-3C1BCFC5FE5D}"/>
+              </a:ext>
+            </a:extLst>
+          </p:cNvPr>
+          <p:cNvSpPr>
+            <a:spLocks noGrp="1"/>
+          </p:cNvSpPr>
+          <p:nvPr>
+            <p:ph type="title"/>
+          </p:nvPr>
+        </p:nvSpPr>
+        <p:spPr/>
+        <p:txBody>
+          <a:bodyPr/>
+          <a:lstStyle/>
+          <a:p>
+            <a:r>
+              <a:rPr lang="en-US" dirty="0">
+                <a:solidFill>
+                  <a:srgbClr val="FF0000"/>
+                </a:solidFill>
+              </a:rPr>
+              <a:t>Results Can Be Formalized and Interpreted </a:t>
+            </a:r>
+          </a:p>
+        </p:txBody>
+      </p:sp>
+      <p:sp>
+        <p:nvSpPr>
+          <p:cNvPr id="3" name="Content Placeholder 2">
+            <a:extLst>
+              <a:ext uri="{FF2B5EF4-FFF2-40B4-BE49-F238E27FC236}">
+                <a16:creationId xmlns:a16="http://schemas.microsoft.com/office/drawing/2014/main" id="{DB26161D-86B2-4722-97BE-CD6C3D640F94}"/>
+              </a:ext>
+            </a:extLst>
+          </p:cNvPr>
+          <p:cNvSpPr>
+            <a:spLocks noGrp="1"/>
+          </p:cNvSpPr>
+          <p:nvPr>
+            <p:ph idx="1"/>
+          </p:nvPr>
+        </p:nvSpPr>
+        <p:spPr/>
+        <p:txBody>
+          <a:bodyPr/>
+          <a:lstStyle/>
+          <a:p>
+            <a:r>
+              <a:rPr lang="en-US" dirty="0"/>
+              <a:t>Basically the discussion section, what test results mean </a:t>
+            </a:r>
+          </a:p>
+          <a:p>
+            <a:r>
+              <a:rPr lang="en-US" dirty="0"/>
+              <a:t>Poo </a:t>
+            </a:r>
+          </a:p>
+        </p:txBody>
+      </p:sp>
+    </p:spTree>
+    <p:extLst>
+      <p:ext uri="{BB962C8B-B14F-4D97-AF65-F5344CB8AC3E}">
+        <p14:creationId xmlns:p14="http://schemas.microsoft.com/office/powerpoint/2010/main" val="1311785409"/>
+      </p:ext>
+    </p:extLst>
+  </p:cSld>
+  <p:clrMapOvr>
+    <a:masterClrMapping/>
+  </p:clrMapOvr>
+</p:sld>
+</file>
+
+<file path=ppt/slides/slide13.xml><?xml version="1.0" encoding="utf-8"?>
+<p:sld xmlns:a="http://schemas.openxmlformats.org/drawingml/2006/main" xmlns:r="http://schemas.openxmlformats.org/officeDocument/2006/relationships" xmlns:p="http://schemas.openxmlformats.org/presentationml/2006/main">
+  <p:cSld>
+    <p:spTree>
+      <p:nvGrpSpPr>
+        <p:cNvPr id="1" name=""/>
+        <p:cNvGrpSpPr/>
+        <p:nvPr/>
+      </p:nvGrpSpPr>
+      <p:grpSpPr>
+        <a:xfrm>
+          <a:off x="0" y="0"/>
+          <a:ext cx="0" cy="0"/>
+          <a:chOff x="0" y="0"/>
+          <a:chExt cx="0" cy="0"/>
+        </a:xfrm>
+      </p:grpSpPr>
+      <p:sp>
+        <p:nvSpPr>
+          <p:cNvPr id="2" name="Title 1">
+            <a:extLst>
+              <a:ext uri="{FF2B5EF4-FFF2-40B4-BE49-F238E27FC236}">
+                <a16:creationId xmlns:a16="http://schemas.microsoft.com/office/drawing/2014/main" id="{445C4B18-2814-4770-B492-A9E33C89866B}"/>
+              </a:ext>
+            </a:extLst>
+          </p:cNvPr>
+          <p:cNvSpPr>
+            <a:spLocks noGrp="1"/>
+          </p:cNvSpPr>
+          <p:nvPr>
+            <p:ph type="title"/>
+          </p:nvPr>
+        </p:nvSpPr>
+        <p:spPr/>
+        <p:txBody>
+          <a:bodyPr/>
+          <a:lstStyle/>
+          <a:p>
+            <a:r>
+              <a:rPr lang="en-US" dirty="0">
+                <a:solidFill>
+                  <a:srgbClr val="FF0000"/>
+                </a:solidFill>
+              </a:rPr>
+              <a:t>Several Limitations Affect These Analyses</a:t>
+            </a:r>
+          </a:p>
+        </p:txBody>
+      </p:sp>
+      <p:sp>
+        <p:nvSpPr>
+          <p:cNvPr id="3" name="Content Placeholder 2">
+            <a:extLst>
+              <a:ext uri="{FF2B5EF4-FFF2-40B4-BE49-F238E27FC236}">
+                <a16:creationId xmlns:a16="http://schemas.microsoft.com/office/drawing/2014/main" id="{2C8A6C9B-ADAD-4C7E-A303-05FB967162A5}"/>
+              </a:ext>
+            </a:extLst>
+          </p:cNvPr>
+          <p:cNvSpPr>
+            <a:spLocks noGrp="1"/>
+          </p:cNvSpPr>
+          <p:nvPr>
+            <p:ph idx="1"/>
+          </p:nvPr>
+        </p:nvSpPr>
+        <p:spPr/>
+        <p:txBody>
+          <a:bodyPr/>
+          <a:lstStyle/>
+          <a:p>
+            <a:r>
+              <a:rPr lang="en-US" dirty="0"/>
+              <a:t>Some for q1</a:t>
+            </a:r>
+          </a:p>
+          <a:p>
+            <a:r>
+              <a:rPr lang="en-US" dirty="0"/>
+              <a:t>Some for q2</a:t>
+            </a:r>
+          </a:p>
+          <a:p>
+            <a:r>
+              <a:rPr lang="en-US" dirty="0"/>
+              <a:t>Some for q3</a:t>
+            </a:r>
+          </a:p>
+          <a:p>
+            <a:r>
+              <a:rPr lang="en-US" dirty="0"/>
+              <a:t>Any in general related to data/assumptions</a:t>
+            </a:r>
+          </a:p>
+          <a:p>
+            <a:r>
+              <a:rPr lang="en-US" dirty="0"/>
+              <a:t>Any related to stat modeling we did </a:t>
+            </a:r>
+          </a:p>
+        </p:txBody>
+      </p:sp>
+    </p:spTree>
+    <p:extLst>
+      <p:ext uri="{BB962C8B-B14F-4D97-AF65-F5344CB8AC3E}">
+        <p14:creationId xmlns:p14="http://schemas.microsoft.com/office/powerpoint/2010/main" val="3840243585"/>
+      </p:ext>
+    </p:extLst>
+  </p:cSld>
+  <p:clrMapOvr>
+    <a:masterClrMapping/>
+  </p:clrMapOvr>
+</p:sld>
+</file>
+
+<file path=ppt/slides/slide14.xml><?xml version="1.0" encoding="utf-8"?>
+<p:sld xmlns:a="http://schemas.openxmlformats.org/drawingml/2006/main" xmlns:r="http://schemas.openxmlformats.org/officeDocument/2006/relationships" xmlns:p="http://schemas.openxmlformats.org/presentationml/2006/main">
+  <p:cSld>
+    <p:spTree>
+      <p:nvGrpSpPr>
+        <p:cNvPr id="1" name=""/>
+        <p:cNvGrpSpPr/>
+        <p:nvPr/>
+      </p:nvGrpSpPr>
+      <p:grpSpPr>
+        <a:xfrm>
+          <a:off x="0" y="0"/>
+          <a:ext cx="0" cy="0"/>
+          <a:chOff x="0" y="0"/>
+          <a:chExt cx="0" cy="0"/>
+        </a:xfrm>
+      </p:grpSpPr>
+      <p:sp>
+        <p:nvSpPr>
+          <p:cNvPr id="2" name="Title 1">
+            <a:extLst>
+              <a:ext uri="{FF2B5EF4-FFF2-40B4-BE49-F238E27FC236}">
                 <a16:creationId xmlns:a16="http://schemas.microsoft.com/office/drawing/2014/main" id="{D7EF89CB-4E6F-48F5-9E96-33510CE87A13}"/>
               </a:ext>
             </a:extLst>
@@ -3727,7 +4569,11 @@
           <a:lstStyle/>
           <a:p>
             <a:r>
-              <a:rPr lang="en-US" dirty="0"/>
+              <a:rPr lang="en-US" dirty="0">
+                <a:solidFill>
+                  <a:srgbClr val="FF0000"/>
+                </a:solidFill>
+              </a:rPr>
               <a:t>Ongoing Research Explores Similar Trends</a:t>
             </a:r>
           </a:p>
@@ -3753,12 +4599,6 @@
         <p:txBody>
           <a:bodyPr/>
           <a:lstStyle/>
-          <a:p>
-            <a:r>
-              <a:rPr lang="en-US" dirty="0"/>
-              <a:t>Kind of like a references slide with super-short summary</a:t>
-            </a:r>
-          </a:p>
           <a:p>
             <a:r>
               <a:rPr lang="en-US" dirty="0"/>
@@ -3831,36 +4671,72 @@
           <a:lstStyle/>
           <a:p>
             <a:r>
+              <a:rPr lang="en-US" dirty="0">
+                <a:solidFill>
+                  <a:schemeClr val="accent1"/>
+                </a:solidFill>
+              </a:rPr>
+              <a:t>Industry Experiences Can Inform </a:t>
+            </a:r>
+            <a:br>
+              <a:rPr lang="en-US" dirty="0">
+                <a:solidFill>
+                  <a:schemeClr val="accent1"/>
+                </a:solidFill>
+              </a:rPr>
+            </a:br>
+            <a:r>
+              <a:rPr lang="en-US" dirty="0">
+                <a:solidFill>
+                  <a:schemeClr val="accent1"/>
+                </a:solidFill>
+              </a:rPr>
+              <a:t>Prospective Data Scientists</a:t>
+            </a:r>
+          </a:p>
+        </p:txBody>
+      </p:sp>
+      <p:sp>
+        <p:nvSpPr>
+          <p:cNvPr id="3" name="Content Placeholder 2">
+            <a:extLst>
+              <a:ext uri="{FF2B5EF4-FFF2-40B4-BE49-F238E27FC236}">
+                <a16:creationId xmlns:a16="http://schemas.microsoft.com/office/drawing/2014/main" id="{EED51E21-CD38-45AB-9E9A-894C01A79277}"/>
+              </a:ext>
+            </a:extLst>
+          </p:cNvPr>
+          <p:cNvSpPr>
+            <a:spLocks noGrp="1"/>
+          </p:cNvSpPr>
+          <p:nvPr>
+            <p:ph idx="1"/>
+          </p:nvPr>
+        </p:nvSpPr>
+        <p:spPr/>
+        <p:txBody>
+          <a:bodyPr/>
+          <a:lstStyle/>
+          <a:p>
+            <a:pPr marL="0" indent="0">
+              <a:buNone/>
+            </a:pPr>
+            <a:r>
               <a:rPr lang="en-US" dirty="0"/>
-              <a:t>Industry Experiences Can Inform Prospective Data Scientists</a:t>
-            </a:r>
-          </a:p>
-        </p:txBody>
-      </p:sp>
-      <p:sp>
-        <p:nvSpPr>
-          <p:cNvPr id="3" name="Content Placeholder 2">
-            <a:extLst>
-              <a:ext uri="{FF2B5EF4-FFF2-40B4-BE49-F238E27FC236}">
-                <a16:creationId xmlns:a16="http://schemas.microsoft.com/office/drawing/2014/main" id="{EED51E21-CD38-45AB-9E9A-894C01A79277}"/>
-              </a:ext>
-            </a:extLst>
-          </p:cNvPr>
-          <p:cNvSpPr>
-            <a:spLocks noGrp="1"/>
-          </p:cNvSpPr>
-          <p:nvPr>
-            <p:ph idx="1"/>
-          </p:nvPr>
-        </p:nvSpPr>
-        <p:spPr/>
-        <p:txBody>
-          <a:bodyPr/>
-          <a:lstStyle/>
-          <a:p>
+              <a:t>Exploring high-volume data related to data science positions around the world enables us to:</a:t>
+            </a:r>
+          </a:p>
+          <a:p>
+            <a:pPr lvl="1"/>
             <a:r>
               <a:rPr lang="en-US" dirty="0"/>
-              <a:t>Motivation/applicability</a:t>
+              <a:t>Identify factors that significantly affect benefits </a:t>
+            </a:r>
+          </a:p>
+          <a:p>
+            <a:pPr lvl="1"/>
+            <a:r>
+              <a:rPr lang="en-US" dirty="0"/>
+              <a:t>Distinguish between the common skills and tools used in different roles </a:t>
             </a:r>
           </a:p>
         </p:txBody>
@@ -3917,36 +4793,74 @@
           <a:lstStyle/>
           <a:p>
             <a:r>
+              <a:rPr lang="en-US" dirty="0">
+                <a:solidFill>
+                  <a:schemeClr val="accent1"/>
+                </a:solidFill>
+              </a:rPr>
+              <a:t>Suitable Data Available Via Kaggle</a:t>
+            </a:r>
+          </a:p>
+        </p:txBody>
+      </p:sp>
+      <p:sp>
+        <p:nvSpPr>
+          <p:cNvPr id="3" name="Content Placeholder 2">
+            <a:extLst>
+              <a:ext uri="{FF2B5EF4-FFF2-40B4-BE49-F238E27FC236}">
+                <a16:creationId xmlns:a16="http://schemas.microsoft.com/office/drawing/2014/main" id="{0BCDE9AC-CE2E-4284-98FD-6F52041DE2B7}"/>
+              </a:ext>
+            </a:extLst>
+          </p:cNvPr>
+          <p:cNvSpPr>
+            <a:spLocks noGrp="1"/>
+          </p:cNvSpPr>
+          <p:nvPr>
+            <p:ph idx="1"/>
+          </p:nvPr>
+        </p:nvSpPr>
+        <p:spPr/>
+        <p:txBody>
+          <a:bodyPr/>
+          <a:lstStyle/>
+          <a:p>
+            <a:r>
               <a:rPr lang="en-US" dirty="0"/>
-              <a:t>Suitable Data Available Via Kaggle</a:t>
-            </a:r>
-          </a:p>
-        </p:txBody>
-      </p:sp>
-      <p:sp>
-        <p:nvSpPr>
-          <p:cNvPr id="3" name="Content Placeholder 2">
-            <a:extLst>
-              <a:ext uri="{FF2B5EF4-FFF2-40B4-BE49-F238E27FC236}">
-                <a16:creationId xmlns:a16="http://schemas.microsoft.com/office/drawing/2014/main" id="{0BCDE9AC-CE2E-4284-98FD-6F52041DE2B7}"/>
-              </a:ext>
-            </a:extLst>
-          </p:cNvPr>
-          <p:cNvSpPr>
-            <a:spLocks noGrp="1"/>
-          </p:cNvSpPr>
-          <p:nvPr>
-            <p:ph idx="1"/>
-          </p:nvPr>
-        </p:nvSpPr>
-        <p:spPr/>
-        <p:txBody>
-          <a:bodyPr/>
-          <a:lstStyle/>
-          <a:p>
+              <a:t>Kaggle hosted an industry-wide survey to collect data regarding:</a:t>
+            </a:r>
+          </a:p>
+          <a:p>
+            <a:pPr lvl="1"/>
             <a:r>
               <a:rPr lang="en-US" dirty="0"/>
-              <a:t>Source/context </a:t>
+              <a:t>The career and academic backgrounds of current data scientists</a:t>
+            </a:r>
+          </a:p>
+          <a:p>
+            <a:pPr lvl="1"/>
+            <a:r>
+              <a:rPr lang="en-US" dirty="0"/>
+              <a:t>In-demand skills and tools for data science employees</a:t>
+            </a:r>
+          </a:p>
+          <a:p>
+            <a:pPr lvl="1"/>
+            <a:r>
+              <a:rPr lang="en-US" dirty="0"/>
+              <a:t>Real-world advice and compensation comparisons from workers</a:t>
+            </a:r>
+          </a:p>
+          <a:p>
+            <a:r>
+              <a:rPr lang="en-US" dirty="0"/>
+              <a:t>The UN / World Bank Group’s 2019 ‘Population Prospects’ also offer: </a:t>
+            </a:r>
+          </a:p>
+          <a:p>
+            <a:pPr lvl="1"/>
+            <a:r>
+              <a:rPr lang="en-US" dirty="0"/>
+              <a:t>Summary data regarding global population densities in major cities </a:t>
             </a:r>
           </a:p>
         </p:txBody>
@@ -4003,56 +4917,96 @@
           <a:lstStyle/>
           <a:p>
             <a:r>
+              <a:rPr lang="en-US" dirty="0">
+                <a:solidFill>
+                  <a:schemeClr val="accent1"/>
+                </a:solidFill>
+              </a:rPr>
+              <a:t>Data Is Robust But Issue-Prone</a:t>
+            </a:r>
+          </a:p>
+        </p:txBody>
+      </p:sp>
+      <p:sp>
+        <p:nvSpPr>
+          <p:cNvPr id="3" name="Content Placeholder 2">
+            <a:extLst>
+              <a:ext uri="{FF2B5EF4-FFF2-40B4-BE49-F238E27FC236}">
+                <a16:creationId xmlns:a16="http://schemas.microsoft.com/office/drawing/2014/main" id="{5A2B4CEF-420F-486F-B636-CD04617EC539}"/>
+              </a:ext>
+            </a:extLst>
+          </p:cNvPr>
+          <p:cNvSpPr>
+            <a:spLocks noGrp="1"/>
+          </p:cNvSpPr>
+          <p:nvPr>
+            <p:ph idx="1"/>
+          </p:nvPr>
+        </p:nvSpPr>
+        <p:spPr/>
+        <p:txBody>
+          <a:bodyPr/>
+          <a:lstStyle/>
+          <a:p>
+            <a:r>
               <a:rPr lang="en-US" dirty="0"/>
-              <a:t>Data Is Robust But Issue-Prone</a:t>
-            </a:r>
-          </a:p>
-        </p:txBody>
-      </p:sp>
-      <p:sp>
-        <p:nvSpPr>
-          <p:cNvPr id="3" name="Content Placeholder 2">
-            <a:extLst>
-              <a:ext uri="{FF2B5EF4-FFF2-40B4-BE49-F238E27FC236}">
-                <a16:creationId xmlns:a16="http://schemas.microsoft.com/office/drawing/2014/main" id="{5A2B4CEF-420F-486F-B636-CD04617EC539}"/>
-              </a:ext>
-            </a:extLst>
-          </p:cNvPr>
-          <p:cNvSpPr>
-            <a:spLocks noGrp="1"/>
-          </p:cNvSpPr>
-          <p:nvPr>
-            <p:ph idx="1"/>
-          </p:nvPr>
-        </p:nvSpPr>
-        <p:spPr/>
-        <p:txBody>
-          <a:bodyPr/>
-          <a:lstStyle/>
-          <a:p>
+              <a:t>Valuable features include:</a:t>
+            </a:r>
+          </a:p>
+          <a:p>
+            <a:pPr lvl="1"/>
             <a:r>
               <a:rPr lang="en-US" dirty="0"/>
-              <a:t>Description</a:t>
-            </a:r>
-          </a:p>
-          <a:p>
+              <a:t>Salary</a:t>
+            </a:r>
+          </a:p>
+          <a:p>
+            <a:pPr lvl="1"/>
             <a:r>
               <a:rPr lang="en-US" dirty="0"/>
-              <a:t>Problems </a:t>
+              <a:t>Recommended programming languages </a:t>
             </a:r>
           </a:p>
           <a:p>
             <a:pPr lvl="1"/>
             <a:r>
               <a:rPr lang="en-US" dirty="0"/>
-              <a:t>Describe any important cleaning/organizing solutions</a:t>
-            </a:r>
-          </a:p>
-          <a:p>
-            <a:pPr marL="0" indent="0">
-              <a:buNone/>
-            </a:pPr>
-            <a:endParaRPr lang="en-US" dirty="0"/>
+              <a:t>Job location </a:t>
+            </a:r>
+          </a:p>
+          <a:p>
+            <a:pPr lvl="1"/>
+            <a:r>
+              <a:rPr lang="en-US" dirty="0"/>
+              <a:t>Employee level of education</a:t>
+            </a:r>
+          </a:p>
+          <a:p>
+            <a:r>
+              <a:rPr lang="en-US" dirty="0"/>
+              <a:t>Several attributes hinder analysis, however: </a:t>
+            </a:r>
+          </a:p>
+          <a:p>
+            <a:pPr lvl="1"/>
+            <a:r>
+              <a:rPr lang="en-US" dirty="0"/>
+              <a:t>Several features are sparsely populated and missing data</a:t>
+            </a:r>
+          </a:p>
+          <a:p>
+            <a:pPr lvl="1"/>
+            <a:r>
+              <a:rPr lang="en-US" dirty="0"/>
+              <a:t>Salaries vs. commissioned compensation </a:t>
+            </a:r>
+          </a:p>
+          <a:p>
+            <a:pPr lvl="1"/>
+            <a:r>
+              <a:rPr lang="en-US" dirty="0"/>
+              <a:t>Free-response answers are hard to incorporate </a:t>
+            </a:r>
           </a:p>
         </p:txBody>
       </p:sp>
@@ -4091,7 +5045,7 @@
           <p:cNvPr id="2" name="Title 1">
             <a:extLst>
               <a:ext uri="{FF2B5EF4-FFF2-40B4-BE49-F238E27FC236}">
-                <a16:creationId xmlns:a16="http://schemas.microsoft.com/office/drawing/2014/main" id="{3FE14928-2ACF-47FE-932D-0DF3CC2BEE15}"/>
+                <a16:creationId xmlns:a16="http://schemas.microsoft.com/office/drawing/2014/main" id="{BF8BB128-6CC9-450A-B2BA-18102A275706}"/>
               </a:ext>
             </a:extLst>
           </p:cNvPr>
@@ -4108,56 +5062,61 @@
           <a:lstStyle/>
           <a:p>
             <a:r>
+              <a:rPr lang="en-US" dirty="0">
+                <a:solidFill>
+                  <a:srgbClr val="FF0000"/>
+                </a:solidFill>
+              </a:rPr>
+              <a:t>Data Is Robust But Issue-Prone</a:t>
+            </a:r>
+          </a:p>
+        </p:txBody>
+      </p:sp>
+      <p:sp>
+        <p:nvSpPr>
+          <p:cNvPr id="3" name="Content Placeholder 2">
+            <a:extLst>
+              <a:ext uri="{FF2B5EF4-FFF2-40B4-BE49-F238E27FC236}">
+                <a16:creationId xmlns:a16="http://schemas.microsoft.com/office/drawing/2014/main" id="{5A2B4CEF-420F-486F-B636-CD04617EC539}"/>
+              </a:ext>
+            </a:extLst>
+          </p:cNvPr>
+          <p:cNvSpPr>
+            <a:spLocks noGrp="1"/>
+          </p:cNvSpPr>
+          <p:nvPr>
+            <p:ph idx="1"/>
+          </p:nvPr>
+        </p:nvSpPr>
+        <p:spPr/>
+        <p:txBody>
+          <a:bodyPr/>
+          <a:lstStyle/>
+          <a:p>
+            <a:r>
               <a:rPr lang="en-US" dirty="0"/>
-              <a:t>Questions Focus On Pay &amp; Job Attributes</a:t>
-            </a:r>
-          </a:p>
-        </p:txBody>
-      </p:sp>
-      <p:sp>
-        <p:nvSpPr>
-          <p:cNvPr id="3" name="Content Placeholder 2">
-            <a:extLst>
-              <a:ext uri="{FF2B5EF4-FFF2-40B4-BE49-F238E27FC236}">
-                <a16:creationId xmlns:a16="http://schemas.microsoft.com/office/drawing/2014/main" id="{AAE573DA-568A-453C-A144-01C15D231483}"/>
-              </a:ext>
-            </a:extLst>
-          </p:cNvPr>
-          <p:cNvSpPr>
-            <a:spLocks noGrp="1"/>
-          </p:cNvSpPr>
-          <p:nvPr>
-            <p:ph idx="1"/>
-          </p:nvPr>
-        </p:nvSpPr>
-        <p:spPr/>
-        <p:txBody>
-          <a:bodyPr/>
-          <a:lstStyle/>
-          <a:p>
+              <a:t>Some initial data-cleaning steps were prudent:</a:t>
+            </a:r>
+          </a:p>
+          <a:p>
+            <a:pPr lvl="1"/>
             <a:r>
               <a:rPr lang="en-US" dirty="0"/>
-              <a:t>Question 1 (formalized)</a:t>
-            </a:r>
-          </a:p>
-          <a:p>
-            <a:r>
-              <a:rPr lang="en-US" dirty="0"/>
-              <a:t>Question 2</a:t>
-            </a:r>
-          </a:p>
-          <a:p>
-            <a:r>
-              <a:rPr lang="en-US" dirty="0"/>
-              <a:t>Question 3</a:t>
-            </a:r>
+              <a:t>I don’t actually know what to put here </a:t>
+            </a:r>
+          </a:p>
+          <a:p>
+            <a:pPr marL="0" indent="0">
+              <a:buNone/>
+            </a:pPr>
+            <a:endParaRPr lang="en-US" dirty="0"/>
           </a:p>
         </p:txBody>
       </p:sp>
     </p:spTree>
     <p:extLst>
       <p:ext uri="{BB962C8B-B14F-4D97-AF65-F5344CB8AC3E}">
-        <p14:creationId xmlns:p14="http://schemas.microsoft.com/office/powerpoint/2010/main" val="199458891"/>
+        <p14:creationId xmlns:p14="http://schemas.microsoft.com/office/powerpoint/2010/main" val="1740734625"/>
       </p:ext>
     </p:extLst>
   </p:cSld>
@@ -4189,7 +5148,7 @@
           <p:cNvPr id="2" name="Title 1">
             <a:extLst>
               <a:ext uri="{FF2B5EF4-FFF2-40B4-BE49-F238E27FC236}">
-                <a16:creationId xmlns:a16="http://schemas.microsoft.com/office/drawing/2014/main" id="{510F01AD-594F-42F9-957B-F579EB50587B}"/>
+                <a16:creationId xmlns:a16="http://schemas.microsoft.com/office/drawing/2014/main" id="{3FE14928-2ACF-47FE-932D-0DF3CC2BEE15}"/>
               </a:ext>
             </a:extLst>
           </p:cNvPr>
@@ -4206,84 +5165,64 @@
           <a:lstStyle/>
           <a:p>
             <a:r>
+              <a:rPr lang="en-US" dirty="0">
+                <a:solidFill>
+                  <a:schemeClr val="accent1"/>
+                </a:solidFill>
+              </a:rPr>
+              <a:t>Questions Focus On Pay &amp; Job Attributes</a:t>
+            </a:r>
+          </a:p>
+        </p:txBody>
+      </p:sp>
+      <p:sp>
+        <p:nvSpPr>
+          <p:cNvPr id="3" name="Content Placeholder 2">
+            <a:extLst>
+              <a:ext uri="{FF2B5EF4-FFF2-40B4-BE49-F238E27FC236}">
+                <a16:creationId xmlns:a16="http://schemas.microsoft.com/office/drawing/2014/main" id="{AAE573DA-568A-453C-A144-01C15D231483}"/>
+              </a:ext>
+            </a:extLst>
+          </p:cNvPr>
+          <p:cNvSpPr>
+            <a:spLocks noGrp="1"/>
+          </p:cNvSpPr>
+          <p:nvPr>
+            <p:ph idx="1"/>
+          </p:nvPr>
+        </p:nvSpPr>
+        <p:spPr/>
+        <p:txBody>
+          <a:bodyPr/>
+          <a:lstStyle/>
+          <a:p>
+            <a:pPr marL="0" indent="0">
+              <a:buNone/>
+            </a:pPr>
+            <a:r>
               <a:rPr lang="en-US" dirty="0"/>
-              <a:t>Arriving at Suitable Analyses </a:t>
-            </a:r>
-          </a:p>
-        </p:txBody>
-      </p:sp>
-      <p:sp>
-        <p:nvSpPr>
-          <p:cNvPr id="3" name="Content Placeholder 2">
-            <a:extLst>
-              <a:ext uri="{FF2B5EF4-FFF2-40B4-BE49-F238E27FC236}">
-                <a16:creationId xmlns:a16="http://schemas.microsoft.com/office/drawing/2014/main" id="{254767CA-1274-497F-BAE8-60C97912578F}"/>
-              </a:ext>
-            </a:extLst>
-          </p:cNvPr>
-          <p:cNvSpPr>
-            <a:spLocks noGrp="1"/>
-          </p:cNvSpPr>
-          <p:nvPr>
-            <p:ph idx="1"/>
-          </p:nvPr>
-        </p:nvSpPr>
-        <p:spPr/>
-        <p:txBody>
-          <a:bodyPr/>
-          <a:lstStyle/>
-          <a:p>
+              <a:t>Compensation is a useful metric for asking: </a:t>
+            </a:r>
+          </a:p>
+          <a:p>
+            <a:pPr lvl="1"/>
             <a:r>
               <a:rPr lang="en-US" dirty="0"/>
-              <a:t>Method for Q1 (_ vs. _)</a:t>
-            </a:r>
-          </a:p>
-          <a:p>
+              <a:t>Is a data scientist’s pay affected by their physical job location? In particular, do employees in high-density environments (like urban cities) see different pay than those in sparsely-populated areas? </a:t>
+            </a:r>
+          </a:p>
+          <a:p>
+            <a:pPr lvl="1"/>
             <a:r>
               <a:rPr lang="en-US" dirty="0"/>
-              <a:t>Method for Q2 (_ vs. _) </a:t>
-            </a:r>
-          </a:p>
-          <a:p>
+              <a:t>What is the relationship between a data scientist’s income and the tools they use on the job? Specifically, do the programming languages they indicate as ‘valuable’ reflect the level of their salary or commission? </a:t>
+            </a:r>
+          </a:p>
+          <a:p>
+            <a:pPr lvl="1"/>
             <a:r>
               <a:rPr lang="en-US" dirty="0"/>
-              <a:t>Method for Q3 (_ vs. _) </a:t>
-            </a:r>
-          </a:p>
-          <a:p>
-            <a:pPr lvl="1"/>
-            <a:r>
-              <a:rPr lang="en-US" dirty="0"/>
-              <a:t>Why appropriate</a:t>
-            </a:r>
-          </a:p>
-          <a:p>
-            <a:pPr lvl="1"/>
-            <a:r>
-              <a:rPr lang="en-US" dirty="0"/>
-              <a:t>Brief review of method (</a:t>
-            </a:r>
-            <a:r>
-              <a:rPr lang="en-US" dirty="0" err="1"/>
-              <a:t>brieeeeef</a:t>
-            </a:r>
-            <a:r>
-              <a:rPr lang="en-US" dirty="0"/>
-              <a:t>) </a:t>
-            </a:r>
-          </a:p>
-          <a:p>
-            <a:pPr lvl="1"/>
-            <a:r>
-              <a:rPr lang="en-US" dirty="0"/>
-              <a:t>Data Columns Involved (+ any additional data wrangling steps)</a:t>
-            </a:r>
-          </a:p>
-          <a:p>
-            <a:pPr lvl="1"/>
-            <a:r>
-              <a:rPr lang="en-US" dirty="0"/>
-              <a:t>Assumptions for test</a:t>
+              <a:t>Does education level play a significant role in compensation? How so? What differences in pay do we see among differently-accoladed employees? </a:t>
             </a:r>
           </a:p>
           <a:p>
@@ -4295,7 +5234,7 @@
     </p:spTree>
     <p:extLst>
       <p:ext uri="{BB962C8B-B14F-4D97-AF65-F5344CB8AC3E}">
-        <p14:creationId xmlns:p14="http://schemas.microsoft.com/office/powerpoint/2010/main" val="3755544966"/>
+        <p14:creationId xmlns:p14="http://schemas.microsoft.com/office/powerpoint/2010/main" val="199458891"/>
       </p:ext>
     </p:extLst>
   </p:cSld>
@@ -4327,7 +5266,7 @@
           <p:cNvPr id="2" name="Title 1">
             <a:extLst>
               <a:ext uri="{FF2B5EF4-FFF2-40B4-BE49-F238E27FC236}">
-                <a16:creationId xmlns:a16="http://schemas.microsoft.com/office/drawing/2014/main" id="{012C7200-64BB-455A-BBB3-A8E823144736}"/>
+                <a16:creationId xmlns:a16="http://schemas.microsoft.com/office/drawing/2014/main" id="{510F01AD-594F-42F9-957B-F579EB50587B}"/>
               </a:ext>
             </a:extLst>
           </p:cNvPr>
@@ -4344,62 +5283,100 @@
           <a:lstStyle/>
           <a:p>
             <a:r>
+              <a:rPr lang="en-US" dirty="0">
+                <a:solidFill>
+                  <a:srgbClr val="FF0000"/>
+                </a:solidFill>
+              </a:rPr>
+              <a:t>Arriving at Suitable Analyses </a:t>
+            </a:r>
+          </a:p>
+        </p:txBody>
+      </p:sp>
+      <p:sp>
+        <p:nvSpPr>
+          <p:cNvPr id="3" name="Content Placeholder 2">
+            <a:extLst>
+              <a:ext uri="{FF2B5EF4-FFF2-40B4-BE49-F238E27FC236}">
+                <a16:creationId xmlns:a16="http://schemas.microsoft.com/office/drawing/2014/main" id="{254767CA-1274-497F-BAE8-60C97912578F}"/>
+              </a:ext>
+            </a:extLst>
+          </p:cNvPr>
+          <p:cNvSpPr>
+            <a:spLocks noGrp="1"/>
+          </p:cNvSpPr>
+          <p:nvPr>
+            <p:ph idx="1"/>
+          </p:nvPr>
+        </p:nvSpPr>
+        <p:spPr/>
+        <p:txBody>
+          <a:bodyPr/>
+          <a:lstStyle/>
+          <a:p>
+            <a:r>
               <a:rPr lang="en-US" dirty="0"/>
-              <a:t>Visualizing Findings for [Q1]</a:t>
-            </a:r>
-          </a:p>
-        </p:txBody>
-      </p:sp>
-      <p:sp>
-        <p:nvSpPr>
-          <p:cNvPr id="3" name="Content Placeholder 2">
-            <a:extLst>
-              <a:ext uri="{FF2B5EF4-FFF2-40B4-BE49-F238E27FC236}">
-                <a16:creationId xmlns:a16="http://schemas.microsoft.com/office/drawing/2014/main" id="{E492AE00-E6E0-4018-A611-A142E7DBBAB7}"/>
-              </a:ext>
-            </a:extLst>
-          </p:cNvPr>
-          <p:cNvSpPr>
-            <a:spLocks noGrp="1"/>
-          </p:cNvSpPr>
-          <p:nvPr>
-            <p:ph idx="1"/>
-          </p:nvPr>
-        </p:nvSpPr>
-        <p:spPr/>
-        <p:txBody>
-          <a:bodyPr/>
-          <a:lstStyle/>
+              <a:t>Method for Q1 (_ vs. _)</a:t>
+            </a:r>
+          </a:p>
           <a:p>
             <a:r>
               <a:rPr lang="en-US" dirty="0"/>
-              <a:t>Relevant plot</a:t>
+              <a:t>Method for Q2 (_ vs. _) </a:t>
             </a:r>
           </a:p>
           <a:p>
             <a:r>
               <a:rPr lang="en-US" dirty="0"/>
-              <a:t>Relevant table</a:t>
-            </a:r>
-          </a:p>
-          <a:p>
+              <a:t>Method for Q3 (_ vs. _) </a:t>
+            </a:r>
+          </a:p>
+          <a:p>
+            <a:pPr lvl="1"/>
             <a:r>
               <a:rPr lang="en-US" dirty="0"/>
-              <a:t>Relevant test stat. and p-value </a:t>
-            </a:r>
-          </a:p>
-          <a:p>
+              <a:t>Why appropriate</a:t>
+            </a:r>
+          </a:p>
+          <a:p>
+            <a:pPr lvl="1"/>
             <a:r>
               <a:rPr lang="en-US" dirty="0"/>
-              <a:t>What we do for the null h</a:t>
-            </a:r>
+              <a:t>Brief review of method (</a:t>
+            </a:r>
+            <a:r>
+              <a:rPr lang="en-US" dirty="0" err="1"/>
+              <a:t>brieeeeef</a:t>
+            </a:r>
+            <a:r>
+              <a:rPr lang="en-US" dirty="0"/>
+              <a:t>) </a:t>
+            </a:r>
+          </a:p>
+          <a:p>
+            <a:pPr lvl="1"/>
+            <a:r>
+              <a:rPr lang="en-US" dirty="0"/>
+              <a:t>Data Columns Involved (+ any additional data wrangling steps)</a:t>
+            </a:r>
+          </a:p>
+          <a:p>
+            <a:pPr lvl="1"/>
+            <a:r>
+              <a:rPr lang="en-US" dirty="0"/>
+              <a:t>Assumptions for test</a:t>
+            </a:r>
+          </a:p>
+          <a:p>
+            <a:pPr lvl="1"/>
+            <a:endParaRPr lang="en-US" dirty="0"/>
           </a:p>
         </p:txBody>
       </p:sp>
     </p:spTree>
     <p:extLst>
       <p:ext uri="{BB962C8B-B14F-4D97-AF65-F5344CB8AC3E}">
-        <p14:creationId xmlns:p14="http://schemas.microsoft.com/office/powerpoint/2010/main" val="749802468"/>
+        <p14:creationId xmlns:p14="http://schemas.microsoft.com/office/powerpoint/2010/main" val="3755544966"/>
       </p:ext>
     </p:extLst>
   </p:cSld>
@@ -4431,7 +5408,7 @@
           <p:cNvPr id="2" name="Title 1">
             <a:extLst>
               <a:ext uri="{FF2B5EF4-FFF2-40B4-BE49-F238E27FC236}">
-                <a16:creationId xmlns:a16="http://schemas.microsoft.com/office/drawing/2014/main" id="{012C7200-64BB-455A-BBB3-A8E823144736}"/>
+                <a16:creationId xmlns:a16="http://schemas.microsoft.com/office/drawing/2014/main" id="{510F01AD-594F-42F9-957B-F579EB50587B}"/>
               </a:ext>
             </a:extLst>
           </p:cNvPr>
@@ -4448,44 +5425,60 @@
           <a:lstStyle/>
           <a:p>
             <a:r>
+              <a:rPr lang="en-US" dirty="0">
+                <a:solidFill>
+                  <a:srgbClr val="FF0000"/>
+                </a:solidFill>
+              </a:rPr>
+              <a:t>Arriving at Suitable Analyses </a:t>
+            </a:r>
+          </a:p>
+        </p:txBody>
+      </p:sp>
+      <p:sp>
+        <p:nvSpPr>
+          <p:cNvPr id="3" name="Content Placeholder 2">
+            <a:extLst>
+              <a:ext uri="{FF2B5EF4-FFF2-40B4-BE49-F238E27FC236}">
+                <a16:creationId xmlns:a16="http://schemas.microsoft.com/office/drawing/2014/main" id="{254767CA-1274-497F-BAE8-60C97912578F}"/>
+              </a:ext>
+            </a:extLst>
+          </p:cNvPr>
+          <p:cNvSpPr>
+            <a:spLocks noGrp="1"/>
+          </p:cNvSpPr>
+          <p:nvPr>
+            <p:ph idx="1"/>
+          </p:nvPr>
+        </p:nvSpPr>
+        <p:spPr/>
+        <p:txBody>
+          <a:bodyPr/>
+          <a:lstStyle/>
+          <a:p>
+            <a:r>
               <a:rPr lang="en-US" dirty="0"/>
-              <a:t>Visualizing Findings for [Q2]</a:t>
-            </a:r>
-          </a:p>
-        </p:txBody>
-      </p:sp>
-      <p:sp>
-        <p:nvSpPr>
-          <p:cNvPr id="3" name="Content Placeholder 2">
-            <a:extLst>
-              <a:ext uri="{FF2B5EF4-FFF2-40B4-BE49-F238E27FC236}">
-                <a16:creationId xmlns:a16="http://schemas.microsoft.com/office/drawing/2014/main" id="{E492AE00-E6E0-4018-A611-A142E7DBBAB7}"/>
-              </a:ext>
-            </a:extLst>
-          </p:cNvPr>
-          <p:cNvSpPr>
-            <a:spLocks noGrp="1"/>
-          </p:cNvSpPr>
-          <p:nvPr>
-            <p:ph idx="1"/>
-          </p:nvPr>
-        </p:nvSpPr>
-        <p:spPr/>
-        <p:txBody>
-          <a:bodyPr/>
-          <a:lstStyle/>
-          <a:p>
+              <a:t>Power calculations and stuff like </a:t>
+            </a:r>
+            <a:r>
+              <a:rPr lang="en-US" dirty="0" err="1"/>
+              <a:t>dat</a:t>
+            </a:r>
             <a:r>
               <a:rPr lang="en-US" dirty="0"/>
-              <a:t>Hello</a:t>
-            </a:r>
+              <a:t> </a:t>
+            </a:r>
+          </a:p>
+          <a:p>
+            <a:pPr lvl="1"/>
+            <a:endParaRPr lang="en-US" dirty="0"/>
           </a:p>
         </p:txBody>
       </p:sp>
     </p:spTree>
     <p:extLst>
       <p:ext uri="{BB962C8B-B14F-4D97-AF65-F5344CB8AC3E}">
-        <p14:creationId xmlns:p14="http://schemas.microsoft.com/office/powerpoint/2010/main" val="3155543544"/>
+        <p14:creationId xmlns:p14="http://schemas.microsoft.com/office/powerpoint/2010/main" val="3998928663"/>
       </p:ext>
     </p:extLst>
   </p:cSld>
@@ -4534,36 +5527,58 @@
           <a:lstStyle/>
           <a:p>
             <a:r>
+              <a:rPr lang="en-US" dirty="0">
+                <a:solidFill>
+                  <a:srgbClr val="FF0000"/>
+                </a:solidFill>
+              </a:rPr>
+              <a:t>Visualizing Findings for [Q1]</a:t>
+            </a:r>
+          </a:p>
+        </p:txBody>
+      </p:sp>
+      <p:sp>
+        <p:nvSpPr>
+          <p:cNvPr id="3" name="Content Placeholder 2">
+            <a:extLst>
+              <a:ext uri="{FF2B5EF4-FFF2-40B4-BE49-F238E27FC236}">
+                <a16:creationId xmlns:a16="http://schemas.microsoft.com/office/drawing/2014/main" id="{E492AE00-E6E0-4018-A611-A142E7DBBAB7}"/>
+              </a:ext>
+            </a:extLst>
+          </p:cNvPr>
+          <p:cNvSpPr>
+            <a:spLocks noGrp="1"/>
+          </p:cNvSpPr>
+          <p:nvPr>
+            <p:ph idx="1"/>
+          </p:nvPr>
+        </p:nvSpPr>
+        <p:spPr/>
+        <p:txBody>
+          <a:bodyPr/>
+          <a:lstStyle/>
+          <a:p>
+            <a:r>
               <a:rPr lang="en-US" dirty="0"/>
-              <a:t>Visualizing Findings for [Q3]</a:t>
-            </a:r>
-          </a:p>
-        </p:txBody>
-      </p:sp>
-      <p:sp>
-        <p:nvSpPr>
-          <p:cNvPr id="3" name="Content Placeholder 2">
-            <a:extLst>
-              <a:ext uri="{FF2B5EF4-FFF2-40B4-BE49-F238E27FC236}">
-                <a16:creationId xmlns:a16="http://schemas.microsoft.com/office/drawing/2014/main" id="{E492AE00-E6E0-4018-A611-A142E7DBBAB7}"/>
-              </a:ext>
-            </a:extLst>
-          </p:cNvPr>
-          <p:cNvSpPr>
-            <a:spLocks noGrp="1"/>
-          </p:cNvSpPr>
-          <p:nvPr>
-            <p:ph idx="1"/>
-          </p:nvPr>
-        </p:nvSpPr>
-        <p:spPr/>
-        <p:txBody>
-          <a:bodyPr/>
-          <a:lstStyle/>
+              <a:t>Relevant plot</a:t>
+            </a:r>
+          </a:p>
           <a:p>
             <a:r>
               <a:rPr lang="en-US" dirty="0"/>
-              <a:t>Hello</a:t>
+              <a:t>Relevant table</a:t>
+            </a:r>
+          </a:p>
+          <a:p>
+            <a:r>
+              <a:rPr lang="en-US" dirty="0"/>
+              <a:t>Relevant test stat. and p-value </a:t>
+            </a:r>
+          </a:p>
+          <a:p>
+            <a:r>
+              <a:rPr lang="en-US" dirty="0"/>
+              <a:t>What we do for the null h</a:t>
             </a:r>
           </a:p>
         </p:txBody>
@@ -4571,7 +5586,7 @@
     </p:spTree>
     <p:extLst>
       <p:ext uri="{BB962C8B-B14F-4D97-AF65-F5344CB8AC3E}">
-        <p14:creationId xmlns:p14="http://schemas.microsoft.com/office/powerpoint/2010/main" val="1970257953"/>
+        <p14:creationId xmlns:p14="http://schemas.microsoft.com/office/powerpoint/2010/main" val="749802468"/>
       </p:ext>
     </p:extLst>
   </p:cSld>
@@ -4874,4 +5889,299 @@
     </a:ext>
   </a:extLst>
 </a:theme>
+</file>
+
+<file path=ppt/theme/theme2.xml><?xml version="1.0" encoding="utf-8"?>
+<a:theme xmlns:a="http://schemas.openxmlformats.org/drawingml/2006/main" name="Office Theme">
+  <a:themeElements>
+    <a:clrScheme name="Office">
+      <a:dk1>
+        <a:sysClr val="windowText" lastClr="000000"/>
+      </a:dk1>
+      <a:lt1>
+        <a:sysClr val="window" lastClr="FFFFFF"/>
+      </a:lt1>
+      <a:dk2>
+        <a:srgbClr val="44546A"/>
+      </a:dk2>
+      <a:lt2>
+        <a:srgbClr val="E7E6E6"/>
+      </a:lt2>
+      <a:accent1>
+        <a:srgbClr val="4472C4"/>
+      </a:accent1>
+      <a:accent2>
+        <a:srgbClr val="ED7D31"/>
+      </a:accent2>
+      <a:accent3>
+        <a:srgbClr val="A5A5A5"/>
+      </a:accent3>
+      <a:accent4>
+        <a:srgbClr val="FFC000"/>
+      </a:accent4>
+      <a:accent5>
+        <a:srgbClr val="5B9BD5"/>
+      </a:accent5>
+      <a:accent6>
+        <a:srgbClr val="70AD47"/>
+      </a:accent6>
+      <a:hlink>
+        <a:srgbClr val="0563C1"/>
+      </a:hlink>
+      <a:folHlink>
+        <a:srgbClr val="954F72"/>
+      </a:folHlink>
+    </a:clrScheme>
+    <a:fontScheme name="Office">
+      <a:majorFont>
+        <a:latin typeface="Calibri Light" panose="020F0302020204030204"/>
+        <a:ea typeface=""/>
+        <a:cs typeface=""/>
+        <a:font script="Jpan" typeface="游ゴシック Light"/>
+        <a:font script="Hang" typeface="맑은 고딕"/>
+        <a:font script="Hans" typeface="等线 Light"/>
+        <a:font script="Hant" typeface="新細明體"/>
+        <a:font script="Arab" typeface="Times New Roman"/>
+        <a:font script="Hebr" typeface="Times New Roman"/>
+        <a:font script="Thai" typeface="Angsana New"/>
+        <a:font script="Ethi" typeface="Nyala"/>
+        <a:font script="Beng" typeface="Vrinda"/>
+        <a:font script="Gujr" typeface="Shruti"/>
+        <a:font script="Khmr" typeface="MoolBoran"/>
+        <a:font script="Knda" typeface="Tunga"/>
+        <a:font script="Guru" typeface="Raavi"/>
+        <a:font script="Cans" typeface="Euphemia"/>
+        <a:font script="Cher" typeface="Plantagenet Cherokee"/>
+        <a:font script="Yiii" typeface="Microsoft Yi Baiti"/>
+        <a:font script="Tibt" typeface="Microsoft Himalaya"/>
+        <a:font script="Thaa" typeface="MV Boli"/>
+        <a:font script="Deva" typeface="Mangal"/>
+        <a:font script="Telu" typeface="Gautami"/>
+        <a:font script="Taml" typeface="Latha"/>
+        <a:font script="Syrc" typeface="Estrangelo Edessa"/>
+        <a:font script="Orya" typeface="Kalinga"/>
+        <a:font script="Mlym" typeface="Kartika"/>
+        <a:font script="Laoo" typeface="DokChampa"/>
+        <a:font script="Sinh" typeface="Iskoola Pota"/>
+        <a:font script="Mong" typeface="Mongolian Baiti"/>
+        <a:font script="Viet" typeface="Times New Roman"/>
+        <a:font script="Uigh" typeface="Microsoft Uighur"/>
+        <a:font script="Geor" typeface="Sylfaen"/>
+        <a:font script="Armn" typeface="Arial"/>
+        <a:font script="Bugi" typeface="Leelawadee UI"/>
+        <a:font script="Bopo" typeface="Microsoft JhengHei"/>
+        <a:font script="Java" typeface="Javanese Text"/>
+        <a:font script="Lisu" typeface="Segoe UI"/>
+        <a:font script="Mymr" typeface="Myanmar Text"/>
+        <a:font script="Nkoo" typeface="Ebrima"/>
+        <a:font script="Olck" typeface="Nirmala UI"/>
+        <a:font script="Osma" typeface="Ebrima"/>
+        <a:font script="Phag" typeface="Phagspa"/>
+        <a:font script="Syrn" typeface="Estrangelo Edessa"/>
+        <a:font script="Syrj" typeface="Estrangelo Edessa"/>
+        <a:font script="Syre" typeface="Estrangelo Edessa"/>
+        <a:font script="Sora" typeface="Nirmala UI"/>
+        <a:font script="Tale" typeface="Microsoft Tai Le"/>
+        <a:font script="Talu" typeface="Microsoft New Tai Lue"/>
+        <a:font script="Tfng" typeface="Ebrima"/>
+      </a:majorFont>
+      <a:minorFont>
+        <a:latin typeface="Calibri" panose="020F0502020204030204"/>
+        <a:ea typeface=""/>
+        <a:cs typeface=""/>
+        <a:font script="Jpan" typeface="游ゴシック"/>
+        <a:font script="Hang" typeface="맑은 고딕"/>
+        <a:font script="Hans" typeface="等线"/>
+        <a:font script="Hant" typeface="新細明體"/>
+        <a:font script="Arab" typeface="Arial"/>
+        <a:font script="Hebr" typeface="Arial"/>
+        <a:font script="Thai" typeface="Cordia New"/>
+        <a:font script="Ethi" typeface="Nyala"/>
+        <a:font script="Beng" typeface="Vrinda"/>
+        <a:font script="Gujr" typeface="Shruti"/>
+        <a:font script="Khmr" typeface="DaunPenh"/>
+        <a:font script="Knda" typeface="Tunga"/>
+        <a:font script="Guru" typeface="Raavi"/>
+        <a:font script="Cans" typeface="Euphemia"/>
+        <a:font script="Cher" typeface="Plantagenet Cherokee"/>
+        <a:font script="Yiii" typeface="Microsoft Yi Baiti"/>
+        <a:font script="Tibt" typeface="Microsoft Himalaya"/>
+        <a:font script="Thaa" typeface="MV Boli"/>
+        <a:font script="Deva" typeface="Mangal"/>
+        <a:font script="Telu" typeface="Gautami"/>
+        <a:font script="Taml" typeface="Latha"/>
+        <a:font script="Syrc" typeface="Estrangelo Edessa"/>
+        <a:font script="Orya" typeface="Kalinga"/>
+        <a:font script="Mlym" typeface="Kartika"/>
+        <a:font script="Laoo" typeface="DokChampa"/>
+        <a:font script="Sinh" typeface="Iskoola Pota"/>
+        <a:font script="Mong" typeface="Mongolian Baiti"/>
+        <a:font script="Viet" typeface="Arial"/>
+        <a:font script="Uigh" typeface="Microsoft Uighur"/>
+        <a:font script="Geor" typeface="Sylfaen"/>
+        <a:font script="Armn" typeface="Arial"/>
+        <a:font script="Bugi" typeface="Leelawadee UI"/>
+        <a:font script="Bopo" typeface="Microsoft JhengHei"/>
+        <a:font script="Java" typeface="Javanese Text"/>
+        <a:font script="Lisu" typeface="Segoe UI"/>
+        <a:font script="Mymr" typeface="Myanmar Text"/>
+        <a:font script="Nkoo" typeface="Ebrima"/>
+        <a:font script="Olck" typeface="Nirmala UI"/>
+        <a:font script="Osma" typeface="Ebrima"/>
+        <a:font script="Phag" typeface="Phagspa"/>
+        <a:font script="Syrn" typeface="Estrangelo Edessa"/>
+        <a:font script="Syrj" typeface="Estrangelo Edessa"/>
+        <a:font script="Syre" typeface="Estrangelo Edessa"/>
+        <a:font script="Sora" typeface="Nirmala UI"/>
+        <a:font script="Tale" typeface="Microsoft Tai Le"/>
+        <a:font script="Talu" typeface="Microsoft New Tai Lue"/>
+        <a:font script="Tfng" typeface="Ebrima"/>
+      </a:minorFont>
+    </a:fontScheme>
+    <a:fmtScheme name="Office">
+      <a:fillStyleLst>
+        <a:solidFill>
+          <a:schemeClr val="phClr"/>
+        </a:solidFill>
+        <a:gradFill rotWithShape="1">
+          <a:gsLst>
+            <a:gs pos="0">
+              <a:schemeClr val="phClr">
+                <a:lumMod val="110000"/>
+                <a:satMod val="105000"/>
+                <a:tint val="67000"/>
+              </a:schemeClr>
+            </a:gs>
+            <a:gs pos="50000">
+              <a:schemeClr val="phClr">
+                <a:lumMod val="105000"/>
+                <a:satMod val="103000"/>
+                <a:tint val="73000"/>
+              </a:schemeClr>
+            </a:gs>
+            <a:gs pos="100000">
+              <a:schemeClr val="phClr">
+                <a:lumMod val="105000"/>
+                <a:satMod val="109000"/>
+                <a:tint val="81000"/>
+              </a:schemeClr>
+            </a:gs>
+          </a:gsLst>
+          <a:lin ang="5400000" scaled="0"/>
+        </a:gradFill>
+        <a:gradFill rotWithShape="1">
+          <a:gsLst>
+            <a:gs pos="0">
+              <a:schemeClr val="phClr">
+                <a:satMod val="103000"/>
+                <a:lumMod val="102000"/>
+                <a:tint val="94000"/>
+              </a:schemeClr>
+            </a:gs>
+            <a:gs pos="50000">
+              <a:schemeClr val="phClr">
+                <a:satMod val="110000"/>
+                <a:lumMod val="100000"/>
+                <a:shade val="100000"/>
+              </a:schemeClr>
+            </a:gs>
+            <a:gs pos="100000">
+              <a:schemeClr val="phClr">
+                <a:lumMod val="99000"/>
+                <a:satMod val="120000"/>
+                <a:shade val="78000"/>
+              </a:schemeClr>
+            </a:gs>
+          </a:gsLst>
+          <a:lin ang="5400000" scaled="0"/>
+        </a:gradFill>
+      </a:fillStyleLst>
+      <a:lnStyleLst>
+        <a:ln w="6350" cap="flat" cmpd="sng" algn="ctr">
+          <a:solidFill>
+            <a:schemeClr val="phClr"/>
+          </a:solidFill>
+          <a:prstDash val="solid"/>
+          <a:miter lim="800000"/>
+        </a:ln>
+        <a:ln w="12700" cap="flat" cmpd="sng" algn="ctr">
+          <a:solidFill>
+            <a:schemeClr val="phClr"/>
+          </a:solidFill>
+          <a:prstDash val="solid"/>
+          <a:miter lim="800000"/>
+        </a:ln>
+        <a:ln w="19050" cap="flat" cmpd="sng" algn="ctr">
+          <a:solidFill>
+            <a:schemeClr val="phClr"/>
+          </a:solidFill>
+          <a:prstDash val="solid"/>
+          <a:miter lim="800000"/>
+        </a:ln>
+      </a:lnStyleLst>
+      <a:effectStyleLst>
+        <a:effectStyle>
+          <a:effectLst/>
+        </a:effectStyle>
+        <a:effectStyle>
+          <a:effectLst/>
+        </a:effectStyle>
+        <a:effectStyle>
+          <a:effectLst>
+            <a:outerShdw blurRad="57150" dist="19050" dir="5400000" algn="ctr" rotWithShape="0">
+              <a:srgbClr val="000000">
+                <a:alpha val="63000"/>
+              </a:srgbClr>
+            </a:outerShdw>
+          </a:effectLst>
+        </a:effectStyle>
+      </a:effectStyleLst>
+      <a:bgFillStyleLst>
+        <a:solidFill>
+          <a:schemeClr val="phClr"/>
+        </a:solidFill>
+        <a:solidFill>
+          <a:schemeClr val="phClr">
+            <a:tint val="95000"/>
+            <a:satMod val="170000"/>
+          </a:schemeClr>
+        </a:solidFill>
+        <a:gradFill rotWithShape="1">
+          <a:gsLst>
+            <a:gs pos="0">
+              <a:schemeClr val="phClr">
+                <a:tint val="93000"/>
+                <a:satMod val="150000"/>
+                <a:shade val="98000"/>
+                <a:lumMod val="102000"/>
+              </a:schemeClr>
+            </a:gs>
+            <a:gs pos="50000">
+              <a:schemeClr val="phClr">
+                <a:tint val="98000"/>
+                <a:satMod val="130000"/>
+                <a:shade val="90000"/>
+                <a:lumMod val="103000"/>
+              </a:schemeClr>
+            </a:gs>
+            <a:gs pos="100000">
+              <a:schemeClr val="phClr">
+                <a:shade val="63000"/>
+                <a:satMod val="120000"/>
+              </a:schemeClr>
+            </a:gs>
+          </a:gsLst>
+          <a:lin ang="5400000" scaled="0"/>
+        </a:gradFill>
+      </a:bgFillStyleLst>
+    </a:fmtScheme>
+  </a:themeElements>
+  <a:objectDefaults/>
+  <a:extraClrSchemeLst/>
+  <a:extLst>
+    <a:ext uri="{05A4C25C-085E-4340-85A3-A5531E510DB2}">
+      <thm15:themeFamily xmlns:thm15="http://schemas.microsoft.com/office/thememl/2012/main" name="Office Theme" id="{62F939B6-93AF-4DB8-9C6B-D6C7DFDC589F}" vid="{4A3C46E8-61CC-4603-A589-7422A47A8E4A}"/>
+    </a:ext>
+  </a:extLst>
+</a:theme>
 </file>
</xml_diff>

<commit_message>
Slides we are submitting
</commit_message>
<xml_diff>
--- a/Presentation/Final Presentation.pptx
+++ b/Presentation/Final Presentation.pptx
@@ -211,7 +211,7 @@
           <a:p>
             <a:fld id="{1C762E85-DB47-45FA-B927-186CB0BA773D}" type="datetimeFigureOut">
               <a:rPr lang="en-US" smtClean="0"/>
-              <a:t>3/7/2020</a:t>
+              <a:t>3/8/2020</a:t>
             </a:fld>
             <a:endParaRPr lang="en-US"/>
           </a:p>
@@ -709,7 +709,7 @@
           <a:p>
             <a:fld id="{ED588561-B850-4902-B3B0-7171AFA22625}" type="datetimeFigureOut">
               <a:rPr lang="en-US" smtClean="0"/>
-              <a:t>3/7/2020</a:t>
+              <a:t>3/8/2020</a:t>
             </a:fld>
             <a:endParaRPr lang="en-US"/>
           </a:p>
@@ -907,7 +907,7 @@
           <a:p>
             <a:fld id="{ED588561-B850-4902-B3B0-7171AFA22625}" type="datetimeFigureOut">
               <a:rPr lang="en-US" smtClean="0"/>
-              <a:t>3/7/2020</a:t>
+              <a:t>3/8/2020</a:t>
             </a:fld>
             <a:endParaRPr lang="en-US"/>
           </a:p>
@@ -1115,7 +1115,7 @@
           <a:p>
             <a:fld id="{ED588561-B850-4902-B3B0-7171AFA22625}" type="datetimeFigureOut">
               <a:rPr lang="en-US" smtClean="0"/>
-              <a:t>3/7/2020</a:t>
+              <a:t>3/8/2020</a:t>
             </a:fld>
             <a:endParaRPr lang="en-US"/>
           </a:p>
@@ -1313,7 +1313,7 @@
           <a:p>
             <a:fld id="{ED588561-B850-4902-B3B0-7171AFA22625}" type="datetimeFigureOut">
               <a:rPr lang="en-US" smtClean="0"/>
-              <a:t>3/7/2020</a:t>
+              <a:t>3/8/2020</a:t>
             </a:fld>
             <a:endParaRPr lang="en-US"/>
           </a:p>
@@ -1588,7 +1588,7 @@
           <a:p>
             <a:fld id="{ED588561-B850-4902-B3B0-7171AFA22625}" type="datetimeFigureOut">
               <a:rPr lang="en-US" smtClean="0"/>
-              <a:t>3/7/2020</a:t>
+              <a:t>3/8/2020</a:t>
             </a:fld>
             <a:endParaRPr lang="en-US"/>
           </a:p>
@@ -1853,7 +1853,7 @@
           <a:p>
             <a:fld id="{ED588561-B850-4902-B3B0-7171AFA22625}" type="datetimeFigureOut">
               <a:rPr lang="en-US" smtClean="0"/>
-              <a:t>3/7/2020</a:t>
+              <a:t>3/8/2020</a:t>
             </a:fld>
             <a:endParaRPr lang="en-US"/>
           </a:p>
@@ -2265,7 +2265,7 @@
           <a:p>
             <a:fld id="{ED588561-B850-4902-B3B0-7171AFA22625}" type="datetimeFigureOut">
               <a:rPr lang="en-US" smtClean="0"/>
-              <a:t>3/7/2020</a:t>
+              <a:t>3/8/2020</a:t>
             </a:fld>
             <a:endParaRPr lang="en-US"/>
           </a:p>
@@ -2406,7 +2406,7 @@
           <a:p>
             <a:fld id="{ED588561-B850-4902-B3B0-7171AFA22625}" type="datetimeFigureOut">
               <a:rPr lang="en-US" smtClean="0"/>
-              <a:t>3/7/2020</a:t>
+              <a:t>3/8/2020</a:t>
             </a:fld>
             <a:endParaRPr lang="en-US"/>
           </a:p>
@@ -2519,7 +2519,7 @@
           <a:p>
             <a:fld id="{ED588561-B850-4902-B3B0-7171AFA22625}" type="datetimeFigureOut">
               <a:rPr lang="en-US" smtClean="0"/>
-              <a:t>3/7/2020</a:t>
+              <a:t>3/8/2020</a:t>
             </a:fld>
             <a:endParaRPr lang="en-US"/>
           </a:p>
@@ -2830,7 +2830,7 @@
           <a:p>
             <a:fld id="{ED588561-B850-4902-B3B0-7171AFA22625}" type="datetimeFigureOut">
               <a:rPr lang="en-US" smtClean="0"/>
-              <a:t>3/7/2020</a:t>
+              <a:t>3/8/2020</a:t>
             </a:fld>
             <a:endParaRPr lang="en-US"/>
           </a:p>
@@ -3118,7 +3118,7 @@
           <a:p>
             <a:fld id="{ED588561-B850-4902-B3B0-7171AFA22625}" type="datetimeFigureOut">
               <a:rPr lang="en-US" smtClean="0"/>
-              <a:t>3/7/2020</a:t>
+              <a:t>3/8/2020</a:t>
             </a:fld>
             <a:endParaRPr lang="en-US"/>
           </a:p>
@@ -3359,7 +3359,7 @@
           <a:p>
             <a:fld id="{ED588561-B850-4902-B3B0-7171AFA22625}" type="datetimeFigureOut">
               <a:rPr lang="en-US" smtClean="0"/>
-              <a:t>3/7/2020</a:t>
+              <a:t>3/8/2020</a:t>
             </a:fld>
             <a:endParaRPr lang="en-US"/>
           </a:p>
@@ -4277,7 +4277,7 @@
         <p:spPr>
           <a:xfrm>
             <a:off x="184826" y="1690688"/>
-            <a:ext cx="12354127" cy="4801314"/>
+            <a:ext cx="12354127" cy="4893647"/>
           </a:xfrm>
           <a:prstGeom prst="rect">
             <a:avLst/>
@@ -4346,7 +4346,7 @@
           <a:p>
             <a:r>
               <a:rPr lang="en-US" dirty="0"/>
-              <a:t>Null: There is no difference between the salaries of people that live in high density areas compared to low density areas.</a:t>
+              <a:t>Null: There is no difference in the mean salary between for high and low density. </a:t>
             </a:r>
           </a:p>
         </p:txBody>
@@ -4711,7 +4711,7 @@
           <a:p>
             <a:r>
               <a:rPr lang="en-US" dirty="0"/>
-              <a:t>Based on the results we can conclude that there is a statistically significant difference between the compensation of people that live in densely populated areas vs. sparsely populated areas.</a:t>
+              <a:t>Based on the results we can conclude that there is a statistically significant difference between the mean compensation of people that live in densely populated areas vs. sparsely populated areas. (For both densely and non-densely populated areas)</a:t>
             </a:r>
           </a:p>
           <a:p>
@@ -4805,7 +4805,10 @@
           <a:bodyPr/>
           <a:lstStyle/>
           <a:p>
-            <a:endParaRPr lang="en-US"/>
+            <a:r>
+              <a:rPr lang="en-US"/>
+              <a:t>Variances were not equal</a:t>
+            </a:r>
           </a:p>
           <a:p>
             <a:r>
@@ -5735,7 +5738,15 @@
           <a:p>
             <a:r>
               <a:rPr lang="en-US" dirty="0"/>
-              <a:t>Methods for Q1 Welch </a:t>
+              <a:t>Methods for Q1: </a:t>
+            </a:r>
+            <a:r>
+              <a:rPr lang="en-US" dirty="0" err="1"/>
+              <a:t>Anova</a:t>
+            </a:r>
+            <a:r>
+              <a:rPr lang="en-US" dirty="0"/>
+              <a:t>, Linear Regression, Welch </a:t>
             </a:r>
             <a:r>
               <a:rPr lang="en-US" dirty="0" err="1"/>
@@ -6082,8 +6093,8 @@
           </a:p>
           <a:p>
             <a:r>
-              <a:rPr lang="en-US" dirty="0"/>
-              <a:t>Null: There is no difference between commission for high and low density. </a:t>
+              <a:rPr lang="en-US" sz="2400" dirty="0"/>
+              <a:t>Null: There is no difference in the mean commission between for high and low density. </a:t>
             </a:r>
           </a:p>
           <a:p>

</xml_diff>

<commit_message>
adding figures for q2 and updates to presentation
</commit_message>
<xml_diff>
--- a/Presentation/Final Presentation.pptx
+++ b/Presentation/Final Presentation.pptx
@@ -5,7 +5,7 @@
     <p:sldMasterId id="2147483648" r:id="rId1"/>
   </p:sldMasterIdLst>
   <p:notesMasterIdLst>
-    <p:notesMasterId r:id="rId17"/>
+    <p:notesMasterId r:id="rId19"/>
   </p:notesMasterIdLst>
   <p:sldIdLst>
     <p:sldId id="256" r:id="rId2"/>
@@ -19,10 +19,12 @@
     <p:sldId id="262" r:id="rId10"/>
     <p:sldId id="270" r:id="rId11"/>
     <p:sldId id="263" r:id="rId12"/>
-    <p:sldId id="264" r:id="rId13"/>
-    <p:sldId id="265" r:id="rId14"/>
-    <p:sldId id="266" r:id="rId15"/>
-    <p:sldId id="267" r:id="rId16"/>
+    <p:sldId id="271" r:id="rId13"/>
+    <p:sldId id="272" r:id="rId14"/>
+    <p:sldId id="273" r:id="rId15"/>
+    <p:sldId id="265" r:id="rId16"/>
+    <p:sldId id="266" r:id="rId17"/>
+    <p:sldId id="267" r:id="rId18"/>
   </p:sldIdLst>
   <p:sldSz cx="12192000" cy="6858000"/>
   <p:notesSz cx="6858000" cy="9144000"/>
@@ -4498,44 +4500,91 @@
           <a:lstStyle/>
           <a:p>
             <a:r>
-              <a:rPr lang="en-US" dirty="0">
+              <a:rPr lang="en-US">
                 <a:solidFill>
                   <a:srgbClr val="FF0000"/>
                 </a:solidFill>
               </a:rPr>
               <a:t>Visualizing Findings for [Q2]</a:t>
             </a:r>
-          </a:p>
-        </p:txBody>
-      </p:sp>
-      <p:sp>
-        <p:nvSpPr>
-          <p:cNvPr id="3" name="Content Placeholder 2">
-            <a:extLst>
-              <a:ext uri="{FF2B5EF4-FFF2-40B4-BE49-F238E27FC236}">
-                <a16:creationId xmlns:a16="http://schemas.microsoft.com/office/drawing/2014/main" id="{E492AE00-E6E0-4018-A611-A142E7DBBAB7}"/>
-              </a:ext>
-            </a:extLst>
-          </p:cNvPr>
-          <p:cNvSpPr>
-            <a:spLocks noGrp="1"/>
-          </p:cNvSpPr>
-          <p:nvPr>
-            <p:ph idx="1"/>
-          </p:nvPr>
-        </p:nvSpPr>
-        <p:spPr/>
-        <p:txBody>
-          <a:bodyPr/>
-          <a:lstStyle/>
-          <a:p>
-            <a:r>
-              <a:rPr lang="en-US" dirty="0"/>
-              <a:t>Hello</a:t>
-            </a:r>
-          </a:p>
-        </p:txBody>
-      </p:sp>
+            <a:endParaRPr lang="en-US" dirty="0">
+              <a:solidFill>
+                <a:srgbClr val="FF0000"/>
+              </a:solidFill>
+            </a:endParaRPr>
+          </a:p>
+        </p:txBody>
+      </p:sp>
+      <p:pic>
+        <p:nvPicPr>
+          <p:cNvPr id="8" name="Content Placeholder 7" descr="A screenshot of a cell phone&#10;&#10;Description automatically generated">
+            <a:extLst>
+              <a:ext uri="{FF2B5EF4-FFF2-40B4-BE49-F238E27FC236}">
+                <a16:creationId xmlns:a16="http://schemas.microsoft.com/office/drawing/2014/main" id="{FBE61A8E-7C0A-4A31-8387-464B6EDA07C1}"/>
+              </a:ext>
+            </a:extLst>
+          </p:cNvPr>
+          <p:cNvPicPr>
+            <a:picLocks noGrp="1" noChangeAspect="1"/>
+          </p:cNvPicPr>
+          <p:nvPr>
+            <p:ph sz="half" idx="1"/>
+          </p:nvPr>
+        </p:nvPicPr>
+        <p:blipFill>
+          <a:blip r:embed="rId2">
+            <a:extLst>
+              <a:ext uri="{28A0092B-C50C-407E-A947-70E740481C1C}">
+                <a14:useLocalDpi xmlns:a14="http://schemas.microsoft.com/office/drawing/2010/main" val="0"/>
+              </a:ext>
+            </a:extLst>
+          </a:blip>
+          <a:stretch>
+            <a:fillRect/>
+          </a:stretch>
+        </p:blipFill>
+        <p:spPr>
+          <a:xfrm>
+            <a:off x="21770" y="3657600"/>
+            <a:ext cx="6074230" cy="2947371"/>
+          </a:xfrm>
+        </p:spPr>
+      </p:pic>
+      <p:pic>
+        <p:nvPicPr>
+          <p:cNvPr id="10" name="Content Placeholder 9" descr="A screenshot of a cell phone&#10;&#10;Description automatically generated">
+            <a:extLst>
+              <a:ext uri="{FF2B5EF4-FFF2-40B4-BE49-F238E27FC236}">
+                <a16:creationId xmlns:a16="http://schemas.microsoft.com/office/drawing/2014/main" id="{616CBBCC-CCED-40F3-BF7E-7AE8E6EBADF0}"/>
+              </a:ext>
+            </a:extLst>
+          </p:cNvPr>
+          <p:cNvPicPr>
+            <a:picLocks noGrp="1" noChangeAspect="1"/>
+          </p:cNvPicPr>
+          <p:nvPr>
+            <p:ph sz="half" idx="2"/>
+          </p:nvPr>
+        </p:nvPicPr>
+        <p:blipFill>
+          <a:blip r:embed="rId3">
+            <a:extLst>
+              <a:ext uri="{28A0092B-C50C-407E-A947-70E740481C1C}">
+                <a14:useLocalDpi xmlns:a14="http://schemas.microsoft.com/office/drawing/2010/main" val="0"/>
+              </a:ext>
+            </a:extLst>
+          </a:blip>
+          <a:stretch>
+            <a:fillRect/>
+          </a:stretch>
+        </p:blipFill>
+        <p:spPr>
+          <a:xfrm>
+            <a:off x="6049805" y="3657600"/>
+            <a:ext cx="6100136" cy="2959941"/>
+          </a:xfrm>
+        </p:spPr>
+      </p:pic>
     </p:spTree>
     <p:extLst>
       <p:ext uri="{BB962C8B-B14F-4D97-AF65-F5344CB8AC3E}">
@@ -4588,48 +4637,93 @@
           <a:lstStyle/>
           <a:p>
             <a:r>
-              <a:rPr lang="en-US" dirty="0">
+              <a:rPr lang="en-US">
                 <a:solidFill>
                   <a:srgbClr val="FF0000"/>
                 </a:solidFill>
               </a:rPr>
-              <a:t>Visualizing Findings for [Q3]</a:t>
-            </a:r>
-          </a:p>
-        </p:txBody>
-      </p:sp>
-      <p:sp>
-        <p:nvSpPr>
-          <p:cNvPr id="3" name="Content Placeholder 2">
-            <a:extLst>
-              <a:ext uri="{FF2B5EF4-FFF2-40B4-BE49-F238E27FC236}">
-                <a16:creationId xmlns:a16="http://schemas.microsoft.com/office/drawing/2014/main" id="{E492AE00-E6E0-4018-A611-A142E7DBBAB7}"/>
-              </a:ext>
-            </a:extLst>
-          </p:cNvPr>
-          <p:cNvSpPr>
-            <a:spLocks noGrp="1"/>
-          </p:cNvSpPr>
-          <p:nvPr>
-            <p:ph idx="1"/>
-          </p:nvPr>
-        </p:nvSpPr>
-        <p:spPr/>
-        <p:txBody>
-          <a:bodyPr/>
-          <a:lstStyle/>
-          <a:p>
-            <a:r>
-              <a:rPr lang="en-US" dirty="0"/>
-              <a:t>Hello</a:t>
-            </a:r>
-          </a:p>
-        </p:txBody>
-      </p:sp>
+              <a:t>Visualizing Findings for [Q2]</a:t>
+            </a:r>
+            <a:endParaRPr lang="en-US" dirty="0">
+              <a:solidFill>
+                <a:srgbClr val="FF0000"/>
+              </a:solidFill>
+            </a:endParaRPr>
+          </a:p>
+        </p:txBody>
+      </p:sp>
+      <p:pic>
+        <p:nvPicPr>
+          <p:cNvPr id="8" name="Content Placeholder 7">
+            <a:extLst>
+              <a:ext uri="{FF2B5EF4-FFF2-40B4-BE49-F238E27FC236}">
+                <a16:creationId xmlns:a16="http://schemas.microsoft.com/office/drawing/2014/main" id="{FBE61A8E-7C0A-4A31-8387-464B6EDA07C1}"/>
+              </a:ext>
+            </a:extLst>
+          </p:cNvPr>
+          <p:cNvPicPr>
+            <a:picLocks noGrp="1" noChangeAspect="1"/>
+          </p:cNvPicPr>
+          <p:nvPr>
+            <p:ph sz="half" idx="1"/>
+          </p:nvPr>
+        </p:nvPicPr>
+        <p:blipFill>
+          <a:blip r:embed="rId2">
+            <a:extLst>
+              <a:ext uri="{28A0092B-C50C-407E-A947-70E740481C1C}">
+                <a14:useLocalDpi xmlns:a14="http://schemas.microsoft.com/office/drawing/2010/main" val="0"/>
+              </a:ext>
+            </a:extLst>
+          </a:blip>
+          <a:srcRect/>
+          <a:stretch/>
+        </p:blipFill>
+        <p:spPr>
+          <a:xfrm>
+            <a:off x="21768" y="3657600"/>
+            <a:ext cx="6100141" cy="2959944"/>
+          </a:xfrm>
+        </p:spPr>
+      </p:pic>
+      <p:pic>
+        <p:nvPicPr>
+          <p:cNvPr id="10" name="Content Placeholder 9">
+            <a:extLst>
+              <a:ext uri="{FF2B5EF4-FFF2-40B4-BE49-F238E27FC236}">
+                <a16:creationId xmlns:a16="http://schemas.microsoft.com/office/drawing/2014/main" id="{616CBBCC-CCED-40F3-BF7E-7AE8E6EBADF0}"/>
+              </a:ext>
+            </a:extLst>
+          </p:cNvPr>
+          <p:cNvPicPr>
+            <a:picLocks noGrp="1" noChangeAspect="1"/>
+          </p:cNvPicPr>
+          <p:nvPr>
+            <p:ph sz="half" idx="2"/>
+          </p:nvPr>
+        </p:nvPicPr>
+        <p:blipFill>
+          <a:blip r:embed="rId3">
+            <a:extLst>
+              <a:ext uri="{28A0092B-C50C-407E-A947-70E740481C1C}">
+                <a14:useLocalDpi xmlns:a14="http://schemas.microsoft.com/office/drawing/2010/main" val="0"/>
+              </a:ext>
+            </a:extLst>
+          </a:blip>
+          <a:srcRect/>
+          <a:stretch/>
+        </p:blipFill>
+        <p:spPr>
+          <a:xfrm>
+            <a:off x="6049808" y="3657600"/>
+            <a:ext cx="6100132" cy="2959940"/>
+          </a:xfrm>
+        </p:spPr>
+      </p:pic>
     </p:spTree>
     <p:extLst>
       <p:ext uri="{BB962C8B-B14F-4D97-AF65-F5344CB8AC3E}">
-        <p14:creationId xmlns:p14="http://schemas.microsoft.com/office/powerpoint/2010/main" val="1970257953"/>
+        <p14:creationId xmlns:p14="http://schemas.microsoft.com/office/powerpoint/2010/main" val="2599401088"/>
       </p:ext>
     </p:extLst>
   </p:cSld>
@@ -4661,7 +4755,7 @@
           <p:cNvPr id="2" name="Title 1">
             <a:extLst>
               <a:ext uri="{FF2B5EF4-FFF2-40B4-BE49-F238E27FC236}">
-                <a16:creationId xmlns:a16="http://schemas.microsoft.com/office/drawing/2014/main" id="{D18D8B46-542F-4295-9C80-3C1BCFC5FE5D}"/>
+                <a16:creationId xmlns:a16="http://schemas.microsoft.com/office/drawing/2014/main" id="{012C7200-64BB-455A-BBB3-A8E823144736}"/>
               </a:ext>
             </a:extLst>
           </p:cNvPr>
@@ -4678,54 +4772,193 @@
           <a:lstStyle/>
           <a:p>
             <a:r>
-              <a:rPr lang="en-US" dirty="0">
+              <a:rPr lang="en-US">
                 <a:solidFill>
                   <a:srgbClr val="FF0000"/>
                 </a:solidFill>
               </a:rPr>
-              <a:t>Results, Formalized and Interpreted </a:t>
-            </a:r>
-          </a:p>
-        </p:txBody>
-      </p:sp>
-      <p:sp>
-        <p:nvSpPr>
-          <p:cNvPr id="3" name="Content Placeholder 2">
-            <a:extLst>
-              <a:ext uri="{FF2B5EF4-FFF2-40B4-BE49-F238E27FC236}">
-                <a16:creationId xmlns:a16="http://schemas.microsoft.com/office/drawing/2014/main" id="{DB26161D-86B2-4722-97BE-CD6C3D640F94}"/>
-              </a:ext>
-            </a:extLst>
-          </p:cNvPr>
-          <p:cNvSpPr>
-            <a:spLocks noGrp="1"/>
-          </p:cNvSpPr>
-          <p:nvPr>
-            <p:ph idx="1"/>
-          </p:nvPr>
-        </p:nvSpPr>
-        <p:spPr/>
-        <p:txBody>
-          <a:bodyPr/>
-          <a:lstStyle/>
-          <a:p>
-            <a:r>
-              <a:rPr lang="en-US" dirty="0"/>
-              <a:t>Based on the results we can conclude that there is a statistically significant difference between the mean compensation of people that live in densely populated areas vs. sparsely populated areas. (For both densely and non-densely populated areas)</a:t>
-            </a:r>
-          </a:p>
-          <a:p>
-            <a:pPr marL="0" indent="0">
-              <a:buNone/>
+              <a:t>Visualizing Findings for [Q2]</a:t>
+            </a:r>
+            <a:endParaRPr lang="en-US" dirty="0">
+              <a:solidFill>
+                <a:srgbClr val="FF0000"/>
+              </a:solidFill>
+            </a:endParaRPr>
+          </a:p>
+        </p:txBody>
+      </p:sp>
+      <p:pic>
+        <p:nvPicPr>
+          <p:cNvPr id="8" name="Content Placeholder 7">
+            <a:extLst>
+              <a:ext uri="{FF2B5EF4-FFF2-40B4-BE49-F238E27FC236}">
+                <a16:creationId xmlns:a16="http://schemas.microsoft.com/office/drawing/2014/main" id="{FBE61A8E-7C0A-4A31-8387-464B6EDA07C1}"/>
+              </a:ext>
+            </a:extLst>
+          </p:cNvPr>
+          <p:cNvPicPr>
+            <a:picLocks noGrp="1" noChangeAspect="1"/>
+          </p:cNvPicPr>
+          <p:nvPr>
+            <p:ph sz="half" idx="1"/>
+          </p:nvPr>
+        </p:nvPicPr>
+        <p:blipFill>
+          <a:blip r:embed="rId2">
+            <a:extLst>
+              <a:ext uri="{28A0092B-C50C-407E-A947-70E740481C1C}">
+                <a14:useLocalDpi xmlns:a14="http://schemas.microsoft.com/office/drawing/2010/main" val="0"/>
+              </a:ext>
+            </a:extLst>
+          </a:blip>
+          <a:srcRect/>
+          <a:stretch/>
+        </p:blipFill>
+        <p:spPr>
+          <a:xfrm>
+            <a:off x="7043057" y="1872343"/>
+            <a:ext cx="3571382" cy="2168694"/>
+          </a:xfrm>
+        </p:spPr>
+      </p:pic>
+      <p:pic>
+        <p:nvPicPr>
+          <p:cNvPr id="10" name="Content Placeholder 9">
+            <a:extLst>
+              <a:ext uri="{FF2B5EF4-FFF2-40B4-BE49-F238E27FC236}">
+                <a16:creationId xmlns:a16="http://schemas.microsoft.com/office/drawing/2014/main" id="{616CBBCC-CCED-40F3-BF7E-7AE8E6EBADF0}"/>
+              </a:ext>
+            </a:extLst>
+          </p:cNvPr>
+          <p:cNvPicPr>
+            <a:picLocks noGrp="1" noChangeAspect="1"/>
+          </p:cNvPicPr>
+          <p:nvPr>
+            <p:ph sz="half" idx="2"/>
+          </p:nvPr>
+        </p:nvPicPr>
+        <p:blipFill>
+          <a:blip r:embed="rId3">
+            <a:extLst>
+              <a:ext uri="{28A0092B-C50C-407E-A947-70E740481C1C}">
+                <a14:useLocalDpi xmlns:a14="http://schemas.microsoft.com/office/drawing/2010/main" val="0"/>
+              </a:ext>
+            </a:extLst>
+          </a:blip>
+          <a:srcRect/>
+          <a:stretch/>
+        </p:blipFill>
+        <p:spPr>
+          <a:xfrm>
+            <a:off x="5133519" y="4789714"/>
+            <a:ext cx="6961992" cy="1180895"/>
+          </a:xfrm>
+        </p:spPr>
+      </p:pic>
+      <p:sp>
+        <p:nvSpPr>
+          <p:cNvPr id="3" name="TextBox 2">
+            <a:extLst>
+              <a:ext uri="{FF2B5EF4-FFF2-40B4-BE49-F238E27FC236}">
+                <a16:creationId xmlns:a16="http://schemas.microsoft.com/office/drawing/2014/main" id="{FCE5C53A-D8DE-4C11-96E6-FB9AE16D306B}"/>
+              </a:ext>
+            </a:extLst>
+          </p:cNvPr>
+          <p:cNvSpPr txBox="1"/>
+          <p:nvPr/>
+        </p:nvSpPr>
+        <p:spPr>
+          <a:xfrm>
+            <a:off x="326571" y="1687286"/>
+            <a:ext cx="4767943" cy="3970318"/>
+          </a:xfrm>
+          <a:prstGeom prst="rect">
+            <a:avLst/>
+          </a:prstGeom>
+          <a:noFill/>
+        </p:spPr>
+        <p:txBody>
+          <a:bodyPr wrap="square" rtlCol="0">
+            <a:spAutoFit/>
+          </a:bodyPr>
+          <a:lstStyle/>
+          <a:p>
+            <a:pPr marL="285750" indent="-285750">
+              <a:buFont typeface="Arial" panose="020B0604020202020204" pitchFamily="34" charset="0"/>
+              <a:buChar char="•"/>
             </a:pPr>
-            <a:endParaRPr lang="en-US" dirty="0"/>
+            <a:r>
+              <a:rPr lang="en-US" dirty="0"/>
+              <a:t>In ANOVA test for each individual Job title group, only the </a:t>
+            </a:r>
+            <a:r>
+              <a:rPr lang="en-US" b="1" i="1" dirty="0"/>
+              <a:t>Scientist</a:t>
+            </a:r>
+            <a:r>
+              <a:rPr lang="en-US" dirty="0"/>
+              <a:t> shows enough evidence to reject the null hypothesis of no difference between type of recommended programming language</a:t>
+            </a:r>
+          </a:p>
+          <a:p>
+            <a:pPr marL="285750" indent="-285750">
+              <a:buFont typeface="Arial" panose="020B0604020202020204" pitchFamily="34" charset="0"/>
+              <a:buChar char="•"/>
+            </a:pPr>
+            <a:endParaRPr lang="en-US" b="1" i="1" dirty="0"/>
+          </a:p>
+          <a:p>
+            <a:pPr marL="285750" indent="-285750">
+              <a:buFont typeface="Arial" panose="020B0604020202020204" pitchFamily="34" charset="0"/>
+              <a:buChar char="•"/>
+            </a:pPr>
+            <a:endParaRPr lang="en-US" b="1" i="1" dirty="0"/>
+          </a:p>
+          <a:p>
+            <a:pPr marL="285750" indent="-285750">
+              <a:buFont typeface="Arial" panose="020B0604020202020204" pitchFamily="34" charset="0"/>
+              <a:buChar char="•"/>
+            </a:pPr>
+            <a:endParaRPr lang="en-US" b="1" i="1" dirty="0"/>
+          </a:p>
+          <a:p>
+            <a:pPr marL="285750" indent="-285750">
+              <a:buFont typeface="Arial" panose="020B0604020202020204" pitchFamily="34" charset="0"/>
+              <a:buChar char="•"/>
+            </a:pPr>
+            <a:endParaRPr lang="en-US" b="1" i="1" dirty="0"/>
+          </a:p>
+          <a:p>
+            <a:pPr marL="285750" indent="-285750">
+              <a:buFont typeface="Arial" panose="020B0604020202020204" pitchFamily="34" charset="0"/>
+              <a:buChar char="•"/>
+            </a:pPr>
+            <a:endParaRPr lang="en-US" b="1" i="1" dirty="0"/>
+          </a:p>
+          <a:p>
+            <a:pPr marL="285750" indent="-285750">
+              <a:buFont typeface="Arial" panose="020B0604020202020204" pitchFamily="34" charset="0"/>
+              <a:buChar char="•"/>
+            </a:pPr>
+            <a:r>
+              <a:rPr lang="en-US" dirty="0"/>
+              <a:t>In the Linear Regression model, only the </a:t>
+            </a:r>
+            <a:r>
+              <a:rPr lang="en-US" b="1" i="1" dirty="0"/>
+              <a:t>Scientist</a:t>
+            </a:r>
+            <a:r>
+              <a:rPr lang="en-US" dirty="0"/>
+              <a:t> group shows evidence of a linear relation between the mean change in salary for python and R programming language.</a:t>
+            </a:r>
           </a:p>
         </p:txBody>
       </p:sp>
     </p:spTree>
     <p:extLst>
       <p:ext uri="{BB962C8B-B14F-4D97-AF65-F5344CB8AC3E}">
-        <p14:creationId xmlns:p14="http://schemas.microsoft.com/office/powerpoint/2010/main" val="1311785409"/>
+        <p14:creationId xmlns:p14="http://schemas.microsoft.com/office/powerpoint/2010/main" val="3304975238"/>
       </p:ext>
     </p:extLst>
   </p:cSld>
@@ -4757,6 +4990,388 @@
           <p:cNvPr id="2" name="Title 1">
             <a:extLst>
               <a:ext uri="{FF2B5EF4-FFF2-40B4-BE49-F238E27FC236}">
+                <a16:creationId xmlns:a16="http://schemas.microsoft.com/office/drawing/2014/main" id="{012C7200-64BB-455A-BBB3-A8E823144736}"/>
+              </a:ext>
+            </a:extLst>
+          </p:cNvPr>
+          <p:cNvSpPr>
+            <a:spLocks noGrp="1"/>
+          </p:cNvSpPr>
+          <p:nvPr>
+            <p:ph type="title"/>
+          </p:nvPr>
+        </p:nvSpPr>
+        <p:spPr/>
+        <p:txBody>
+          <a:bodyPr/>
+          <a:lstStyle/>
+          <a:p>
+            <a:r>
+              <a:rPr lang="en-US">
+                <a:solidFill>
+                  <a:srgbClr val="FF0000"/>
+                </a:solidFill>
+              </a:rPr>
+              <a:t>Visualizing Findings for [Q2]</a:t>
+            </a:r>
+            <a:endParaRPr lang="en-US" dirty="0">
+              <a:solidFill>
+                <a:srgbClr val="FF0000"/>
+              </a:solidFill>
+            </a:endParaRPr>
+          </a:p>
+        </p:txBody>
+      </p:sp>
+      <p:pic>
+        <p:nvPicPr>
+          <p:cNvPr id="8" name="Content Placeholder 7">
+            <a:extLst>
+              <a:ext uri="{FF2B5EF4-FFF2-40B4-BE49-F238E27FC236}">
+                <a16:creationId xmlns:a16="http://schemas.microsoft.com/office/drawing/2014/main" id="{FBE61A8E-7C0A-4A31-8387-464B6EDA07C1}"/>
+              </a:ext>
+            </a:extLst>
+          </p:cNvPr>
+          <p:cNvPicPr>
+            <a:picLocks noGrp="1" noChangeAspect="1"/>
+          </p:cNvPicPr>
+          <p:nvPr>
+            <p:ph sz="half" idx="1"/>
+          </p:nvPr>
+        </p:nvPicPr>
+        <p:blipFill>
+          <a:blip r:embed="rId2">
+            <a:extLst>
+              <a:ext uri="{28A0092B-C50C-407E-A947-70E740481C1C}">
+                <a14:useLocalDpi xmlns:a14="http://schemas.microsoft.com/office/drawing/2010/main" val="0"/>
+              </a:ext>
+            </a:extLst>
+          </a:blip>
+          <a:srcRect/>
+          <a:stretch/>
+        </p:blipFill>
+        <p:spPr>
+          <a:xfrm>
+            <a:off x="7043057" y="1891434"/>
+            <a:ext cx="3571382" cy="2130512"/>
+          </a:xfrm>
+        </p:spPr>
+      </p:pic>
+      <p:pic>
+        <p:nvPicPr>
+          <p:cNvPr id="10" name="Content Placeholder 9">
+            <a:extLst>
+              <a:ext uri="{FF2B5EF4-FFF2-40B4-BE49-F238E27FC236}">
+                <a16:creationId xmlns:a16="http://schemas.microsoft.com/office/drawing/2014/main" id="{616CBBCC-CCED-40F3-BF7E-7AE8E6EBADF0}"/>
+              </a:ext>
+            </a:extLst>
+          </p:cNvPr>
+          <p:cNvPicPr>
+            <a:picLocks noGrp="1" noChangeAspect="1"/>
+          </p:cNvPicPr>
+          <p:nvPr>
+            <p:ph sz="half" idx="2"/>
+          </p:nvPr>
+        </p:nvPicPr>
+        <p:blipFill>
+          <a:blip r:embed="rId3">
+            <a:extLst>
+              <a:ext uri="{28A0092B-C50C-407E-A947-70E740481C1C}">
+                <a14:useLocalDpi xmlns:a14="http://schemas.microsoft.com/office/drawing/2010/main" val="0"/>
+              </a:ext>
+            </a:extLst>
+          </a:blip>
+          <a:srcRect/>
+          <a:stretch/>
+        </p:blipFill>
+        <p:spPr>
+          <a:xfrm>
+            <a:off x="6353087" y="4550228"/>
+            <a:ext cx="5755160" cy="1545772"/>
+          </a:xfrm>
+        </p:spPr>
+      </p:pic>
+      <p:sp>
+        <p:nvSpPr>
+          <p:cNvPr id="5" name="TextBox 4">
+            <a:extLst>
+              <a:ext uri="{FF2B5EF4-FFF2-40B4-BE49-F238E27FC236}">
+                <a16:creationId xmlns:a16="http://schemas.microsoft.com/office/drawing/2014/main" id="{E600ACFE-0962-40A9-BBE7-B73BBDDC0ED4}"/>
+              </a:ext>
+            </a:extLst>
+          </p:cNvPr>
+          <p:cNvSpPr txBox="1"/>
+          <p:nvPr/>
+        </p:nvSpPr>
+        <p:spPr>
+          <a:xfrm>
+            <a:off x="326571" y="1687286"/>
+            <a:ext cx="5638800" cy="4801314"/>
+          </a:xfrm>
+          <a:prstGeom prst="rect">
+            <a:avLst/>
+          </a:prstGeom>
+          <a:noFill/>
+        </p:spPr>
+        <p:txBody>
+          <a:bodyPr wrap="square" rtlCol="0">
+            <a:spAutoFit/>
+          </a:bodyPr>
+          <a:lstStyle/>
+          <a:p>
+            <a:pPr marL="285750" indent="-285750">
+              <a:buFont typeface="Arial" panose="020B0604020202020204" pitchFamily="34" charset="0"/>
+              <a:buChar char="•"/>
+            </a:pPr>
+            <a:r>
+              <a:rPr lang="en-US" dirty="0"/>
+              <a:t>In ANOVA test for each individual </a:t>
+            </a:r>
+            <a:r>
+              <a:rPr lang="en-US" i="1" dirty="0"/>
+              <a:t>Recommended Programming Language</a:t>
+            </a:r>
+            <a:r>
+              <a:rPr lang="en-US" dirty="0"/>
+              <a:t> groups, only the </a:t>
+            </a:r>
+            <a:r>
+              <a:rPr lang="en-US" b="1" i="1" dirty="0"/>
+              <a:t>Python and R</a:t>
+            </a:r>
+            <a:r>
+              <a:rPr lang="en-US" dirty="0"/>
+              <a:t> shows enough evidence to reject the null hypothesis of no difference between type of </a:t>
+            </a:r>
+            <a:r>
+              <a:rPr lang="en-US" i="1" dirty="0"/>
+              <a:t>Job Title.</a:t>
+            </a:r>
+            <a:endParaRPr lang="en-US" dirty="0"/>
+          </a:p>
+          <a:p>
+            <a:pPr marL="285750" indent="-285750">
+              <a:buFont typeface="Arial" panose="020B0604020202020204" pitchFamily="34" charset="0"/>
+              <a:buChar char="•"/>
+            </a:pPr>
+            <a:endParaRPr lang="en-US" b="1" i="1" dirty="0"/>
+          </a:p>
+          <a:p>
+            <a:pPr marL="285750" indent="-285750">
+              <a:buFont typeface="Arial" panose="020B0604020202020204" pitchFamily="34" charset="0"/>
+              <a:buChar char="•"/>
+            </a:pPr>
+            <a:endParaRPr lang="en-US" b="1" i="1" dirty="0"/>
+          </a:p>
+          <a:p>
+            <a:pPr marL="285750" indent="-285750">
+              <a:buFont typeface="Arial" panose="020B0604020202020204" pitchFamily="34" charset="0"/>
+              <a:buChar char="•"/>
+            </a:pPr>
+            <a:endParaRPr lang="en-US" b="1" i="1" dirty="0"/>
+          </a:p>
+          <a:p>
+            <a:pPr marL="285750" indent="-285750">
+              <a:buFont typeface="Arial" panose="020B0604020202020204" pitchFamily="34" charset="0"/>
+              <a:buChar char="•"/>
+            </a:pPr>
+            <a:endParaRPr lang="en-US" b="1" i="1" dirty="0"/>
+          </a:p>
+          <a:p>
+            <a:pPr marL="285750" indent="-285750">
+              <a:buFont typeface="Arial" panose="020B0604020202020204" pitchFamily="34" charset="0"/>
+              <a:buChar char="•"/>
+            </a:pPr>
+            <a:endParaRPr lang="en-US" b="1" i="1" dirty="0"/>
+          </a:p>
+          <a:p>
+            <a:pPr marL="285750" indent="-285750">
+              <a:buFont typeface="Arial" panose="020B0604020202020204" pitchFamily="34" charset="0"/>
+              <a:buChar char="•"/>
+            </a:pPr>
+            <a:endParaRPr lang="en-US" b="1" i="1" dirty="0"/>
+          </a:p>
+          <a:p>
+            <a:pPr marL="285750" indent="-285750">
+              <a:buFont typeface="Arial" panose="020B0604020202020204" pitchFamily="34" charset="0"/>
+              <a:buChar char="•"/>
+            </a:pPr>
+            <a:endParaRPr lang="en-US" b="1" i="1" dirty="0"/>
+          </a:p>
+          <a:p>
+            <a:pPr marL="285750" indent="-285750">
+              <a:buFont typeface="Arial" panose="020B0604020202020204" pitchFamily="34" charset="0"/>
+              <a:buChar char="•"/>
+            </a:pPr>
+            <a:r>
+              <a:rPr lang="en-US" dirty="0"/>
+              <a:t>In the Linear Regression model, </a:t>
+            </a:r>
+            <a:r>
+              <a:rPr lang="en-US" b="1" i="1" dirty="0"/>
+              <a:t>Python</a:t>
+            </a:r>
+            <a:r>
+              <a:rPr lang="en-US" dirty="0"/>
+              <a:t> group shows evidence of a linear relation between the mean change in salary for </a:t>
+            </a:r>
+            <a:r>
+              <a:rPr lang="en-US" i="1" dirty="0"/>
+              <a:t>Job Titles</a:t>
+            </a:r>
+            <a:r>
+              <a:rPr lang="en-US" dirty="0"/>
+              <a:t> Other and Research Analyst to the Engineer Title. </a:t>
+            </a:r>
+            <a:r>
+              <a:rPr lang="en-US" b="1" i="1" dirty="0"/>
+              <a:t>R</a:t>
+            </a:r>
+            <a:r>
+              <a:rPr lang="en-US" dirty="0"/>
+              <a:t> shows a statistically significant linear relation between the change in mean of salary between the Engineering and Other </a:t>
+            </a:r>
+            <a:r>
+              <a:rPr lang="en-US" i="1" dirty="0"/>
+              <a:t>Job Titles.</a:t>
+            </a:r>
+            <a:r>
+              <a:rPr lang="en-US" dirty="0"/>
+              <a:t> </a:t>
+            </a:r>
+          </a:p>
+        </p:txBody>
+      </p:sp>
+    </p:spTree>
+    <p:extLst>
+      <p:ext uri="{BB962C8B-B14F-4D97-AF65-F5344CB8AC3E}">
+        <p14:creationId xmlns:p14="http://schemas.microsoft.com/office/powerpoint/2010/main" val="2266348318"/>
+      </p:ext>
+    </p:extLst>
+  </p:cSld>
+  <p:clrMapOvr>
+    <a:masterClrMapping/>
+  </p:clrMapOvr>
+</p:sld>
+</file>
+
+<file path=ppt/slides/slide15.xml><?xml version="1.0" encoding="utf-8"?>
+<p:sld xmlns:a="http://schemas.openxmlformats.org/drawingml/2006/main" xmlns:r="http://schemas.openxmlformats.org/officeDocument/2006/relationships" xmlns:p="http://schemas.openxmlformats.org/presentationml/2006/main">
+  <p:cSld>
+    <p:spTree>
+      <p:nvGrpSpPr>
+        <p:cNvPr id="1" name=""/>
+        <p:cNvGrpSpPr/>
+        <p:nvPr/>
+      </p:nvGrpSpPr>
+      <p:grpSpPr>
+        <a:xfrm>
+          <a:off x="0" y="0"/>
+          <a:ext cx="0" cy="0"/>
+          <a:chOff x="0" y="0"/>
+          <a:chExt cx="0" cy="0"/>
+        </a:xfrm>
+      </p:grpSpPr>
+      <p:sp>
+        <p:nvSpPr>
+          <p:cNvPr id="2" name="Title 1">
+            <a:extLst>
+              <a:ext uri="{FF2B5EF4-FFF2-40B4-BE49-F238E27FC236}">
+                <a16:creationId xmlns:a16="http://schemas.microsoft.com/office/drawing/2014/main" id="{D18D8B46-542F-4295-9C80-3C1BCFC5FE5D}"/>
+              </a:ext>
+            </a:extLst>
+          </p:cNvPr>
+          <p:cNvSpPr>
+            <a:spLocks noGrp="1"/>
+          </p:cNvSpPr>
+          <p:nvPr>
+            <p:ph type="title"/>
+          </p:nvPr>
+        </p:nvSpPr>
+        <p:spPr/>
+        <p:txBody>
+          <a:bodyPr/>
+          <a:lstStyle/>
+          <a:p>
+            <a:r>
+              <a:rPr lang="en-US" dirty="0">
+                <a:solidFill>
+                  <a:srgbClr val="FF0000"/>
+                </a:solidFill>
+              </a:rPr>
+              <a:t>Results, Formalized and Interpreted </a:t>
+            </a:r>
+          </a:p>
+        </p:txBody>
+      </p:sp>
+      <p:sp>
+        <p:nvSpPr>
+          <p:cNvPr id="3" name="Content Placeholder 2">
+            <a:extLst>
+              <a:ext uri="{FF2B5EF4-FFF2-40B4-BE49-F238E27FC236}">
+                <a16:creationId xmlns:a16="http://schemas.microsoft.com/office/drawing/2014/main" id="{DB26161D-86B2-4722-97BE-CD6C3D640F94}"/>
+              </a:ext>
+            </a:extLst>
+          </p:cNvPr>
+          <p:cNvSpPr>
+            <a:spLocks noGrp="1"/>
+          </p:cNvSpPr>
+          <p:nvPr>
+            <p:ph idx="1"/>
+          </p:nvPr>
+        </p:nvSpPr>
+        <p:spPr/>
+        <p:txBody>
+          <a:bodyPr/>
+          <a:lstStyle/>
+          <a:p>
+            <a:r>
+              <a:rPr lang="en-US" dirty="0"/>
+              <a:t>Based on the results we can conclude that there is a statistically significant difference between the mean compensation of people that live in densely populated areas vs. sparsely populated areas. (For both densely and non-densely populated areas)</a:t>
+            </a:r>
+          </a:p>
+          <a:p>
+            <a:pPr marL="0" indent="0">
+              <a:buNone/>
+            </a:pPr>
+            <a:endParaRPr lang="en-US" dirty="0"/>
+          </a:p>
+        </p:txBody>
+      </p:sp>
+    </p:spTree>
+    <p:extLst>
+      <p:ext uri="{BB962C8B-B14F-4D97-AF65-F5344CB8AC3E}">
+        <p14:creationId xmlns:p14="http://schemas.microsoft.com/office/powerpoint/2010/main" val="1311785409"/>
+      </p:ext>
+    </p:extLst>
+  </p:cSld>
+  <p:clrMapOvr>
+    <a:masterClrMapping/>
+  </p:clrMapOvr>
+</p:sld>
+</file>
+
+<file path=ppt/slides/slide16.xml><?xml version="1.0" encoding="utf-8"?>
+<p:sld xmlns:a="http://schemas.openxmlformats.org/drawingml/2006/main" xmlns:r="http://schemas.openxmlformats.org/officeDocument/2006/relationships" xmlns:p="http://schemas.openxmlformats.org/presentationml/2006/main">
+  <p:cSld>
+    <p:spTree>
+      <p:nvGrpSpPr>
+        <p:cNvPr id="1" name=""/>
+        <p:cNvGrpSpPr/>
+        <p:nvPr/>
+      </p:nvGrpSpPr>
+      <p:grpSpPr>
+        <a:xfrm>
+          <a:off x="0" y="0"/>
+          <a:ext cx="0" cy="0"/>
+          <a:chOff x="0" y="0"/>
+          <a:chExt cx="0" cy="0"/>
+        </a:xfrm>
+      </p:grpSpPr>
+      <p:sp>
+        <p:nvSpPr>
+          <p:cNvPr id="2" name="Title 1">
+            <a:extLst>
+              <a:ext uri="{FF2B5EF4-FFF2-40B4-BE49-F238E27FC236}">
                 <a16:creationId xmlns:a16="http://schemas.microsoft.com/office/drawing/2014/main" id="{445C4B18-2814-4770-B492-A9E33C89866B}"/>
               </a:ext>
             </a:extLst>
@@ -4806,14 +5421,14 @@
           <a:lstStyle/>
           <a:p>
             <a:r>
-              <a:rPr lang="en-US"/>
+              <a:rPr lang="en-US" dirty="0"/>
               <a:t>Variances were not equal</a:t>
             </a:r>
           </a:p>
           <a:p>
             <a:r>
               <a:rPr lang="en-US" dirty="0"/>
-              <a:t>Some for q2</a:t>
+              <a:t>The size of the dataset and the possible unequal variances of Job Title distributions.</a:t>
             </a:r>
           </a:p>
           <a:p>
@@ -4851,7 +5466,7 @@
 </p:sld>
 </file>
 
-<file path=ppt/slides/slide15.xml><?xml version="1.0" encoding="utf-8"?>
+<file path=ppt/slides/slide17.xml><?xml version="1.0" encoding="utf-8"?>
 <p:sld xmlns:a="http://schemas.openxmlformats.org/drawingml/2006/main" xmlns:r="http://schemas.openxmlformats.org/officeDocument/2006/relationships" xmlns:p="http://schemas.openxmlformats.org/presentationml/2006/main">
   <p:cSld>
     <p:spTree>
@@ -5733,7 +6348,9 @@
         </p:nvSpPr>
         <p:spPr/>
         <p:txBody>
-          <a:bodyPr/>
+          <a:bodyPr>
+            <a:normAutofit fontScale="92500" lnSpcReduction="10000"/>
+          </a:bodyPr>
           <a:lstStyle/>
           <a:p>
             <a:r>
@@ -5786,7 +6403,21 @@
           <a:p>
             <a:r>
               <a:rPr lang="en-US" dirty="0"/>
-              <a:t>Method for Q2 (_ vs. _) </a:t>
+              <a:t>Method for Q2: ANOVA and Linear Regression</a:t>
+            </a:r>
+          </a:p>
+          <a:p>
+            <a:pPr lvl="1"/>
+            <a:r>
+              <a:rPr lang="en-US" dirty="0"/>
+              <a:t>Datasets seem to be close enough in variance</a:t>
+            </a:r>
+          </a:p>
+          <a:p>
+            <a:pPr lvl="1"/>
+            <a:r>
+              <a:rPr lang="en-US" dirty="0"/>
+              <a:t>Belief of linear relation with “higher” position (need for more math theory) </a:t>
             </a:r>
           </a:p>
           <a:p>

</xml_diff>